<commit_message>
update discovery to link to repo
</commit_message>
<xml_diff>
--- a/PRESENTATIONS/2020-06-08-Discovery-McCool.pptx
+++ b/PRESENTATIONS/2020-06-08-Discovery-McCool.pptx
@@ -5,7 +5,7 @@
     <p:sldMasterId id="2147483648" r:id="rId1"/>
   </p:sldMasterIdLst>
   <p:notesMasterIdLst>
-    <p:notesMasterId r:id="rId9"/>
+    <p:notesMasterId r:id="rId11"/>
   </p:notesMasterIdLst>
   <p:sldIdLst>
     <p:sldId id="256" r:id="rId2"/>
@@ -14,7 +14,9 @@
     <p:sldId id="260" r:id="rId5"/>
     <p:sldId id="261" r:id="rId6"/>
     <p:sldId id="262" r:id="rId7"/>
-    <p:sldId id="263" r:id="rId8"/>
+    <p:sldId id="264" r:id="rId8"/>
+    <p:sldId id="263" r:id="rId9"/>
+    <p:sldId id="265" r:id="rId10"/>
   </p:sldIdLst>
   <p:sldSz cx="12192000" cy="6858000"/>
   <p:notesSz cx="6858000" cy="9144000"/>
@@ -214,7 +216,7 @@
           <a:p>
             <a:fld id="{8389B5DD-0274-BF45-B4C5-62E173E8F634}" type="datetimeFigureOut">
               <a:rPr lang="en-US" smtClean="0"/>
-              <a:t>6/7/2020</a:t>
+              <a:t>6/8/20</a:t>
             </a:fld>
             <a:endParaRPr lang="en-US"/>
           </a:p>
@@ -503,7 +505,7 @@
           <p:cNvPr id="2" name="Title 1">
             <a:extLst>
               <a:ext uri="{FF2B5EF4-FFF2-40B4-BE49-F238E27FC236}">
-                <a16:creationId xmlns:a16="http://schemas.microsoft.com/office/drawing/2014/main" xmlns="" id="{FD78CDCF-83F0-654A-8E95-83ACE832996E}"/>
+                <a16:creationId xmlns:a16="http://schemas.microsoft.com/office/drawing/2014/main" id="{FD78CDCF-83F0-654A-8E95-83ACE832996E}"/>
               </a:ext>
             </a:extLst>
           </p:cNvPr>
@@ -532,7 +534,7 @@
           </a:lstStyle>
           <a:p>
             <a:r>
-              <a:rPr lang="en-US" smtClean="0"/>
+              <a:rPr lang="en-US"/>
               <a:t>Click to edit Master title style</a:t>
             </a:r>
             <a:endParaRPr lang="en-US" dirty="0"/>
@@ -544,7 +546,7 @@
           <p:cNvPr id="3" name="Subtitle 2">
             <a:extLst>
               <a:ext uri="{FF2B5EF4-FFF2-40B4-BE49-F238E27FC236}">
-                <a16:creationId xmlns:a16="http://schemas.microsoft.com/office/drawing/2014/main" xmlns="" id="{EA1FDD66-E57C-D246-A8D3-5F7E64604763}"/>
+                <a16:creationId xmlns:a16="http://schemas.microsoft.com/office/drawing/2014/main" id="{EA1FDD66-E57C-D246-A8D3-5F7E64604763}"/>
               </a:ext>
             </a:extLst>
           </p:cNvPr>
@@ -603,7 +605,7 @@
           </a:lstStyle>
           <a:p>
             <a:r>
-              <a:rPr lang="en-US" smtClean="0"/>
+              <a:rPr lang="en-US"/>
               <a:t>Click to edit Master subtitle style</a:t>
             </a:r>
             <a:endParaRPr lang="en-US" dirty="0"/>
@@ -615,7 +617,7 @@
           <p:cNvPr id="5" name="Footer Placeholder 4">
             <a:extLst>
               <a:ext uri="{FF2B5EF4-FFF2-40B4-BE49-F238E27FC236}">
-                <a16:creationId xmlns:a16="http://schemas.microsoft.com/office/drawing/2014/main" xmlns="" id="{28EA4BBE-75B1-9143-A887-FCA15B99C9D8}"/>
+                <a16:creationId xmlns:a16="http://schemas.microsoft.com/office/drawing/2014/main" id="{28EA4BBE-75B1-9143-A887-FCA15B99C9D8}"/>
               </a:ext>
             </a:extLst>
           </p:cNvPr>
@@ -651,7 +653,7 @@
           <p:cNvPr id="7" name="Picture 6">
             <a:extLst>
               <a:ext uri="{FF2B5EF4-FFF2-40B4-BE49-F238E27FC236}">
-                <a16:creationId xmlns:a16="http://schemas.microsoft.com/office/drawing/2014/main" xmlns="" id="{5C2FA7A7-1EC8-9A45-B674-9F5AA403389C}"/>
+                <a16:creationId xmlns:a16="http://schemas.microsoft.com/office/drawing/2014/main" id="{5C2FA7A7-1EC8-9A45-B674-9F5AA403389C}"/>
               </a:ext>
             </a:extLst>
           </p:cNvPr>
@@ -711,7 +713,7 @@
           <p:cNvPr id="2" name="Title 1">
             <a:extLst>
               <a:ext uri="{FF2B5EF4-FFF2-40B4-BE49-F238E27FC236}">
-                <a16:creationId xmlns:a16="http://schemas.microsoft.com/office/drawing/2014/main" xmlns="" id="{BC9FD7F8-1D21-E24C-867B-27076A867C4A}"/>
+                <a16:creationId xmlns:a16="http://schemas.microsoft.com/office/drawing/2014/main" id="{BC9FD7F8-1D21-E24C-867B-27076A867C4A}"/>
               </a:ext>
             </a:extLst>
           </p:cNvPr>
@@ -736,10 +738,9 @@
           <a:lstStyle/>
           <a:p>
             <a:r>
-              <a:rPr lang="en-US" smtClean="0"/>
+              <a:rPr lang="en-US"/>
               <a:t>Click to edit Master title style</a:t>
             </a:r>
-            <a:endParaRPr lang="en-US"/>
           </a:p>
         </p:txBody>
       </p:sp>
@@ -748,7 +749,7 @@
           <p:cNvPr id="3" name="Vertical Text Placeholder 2">
             <a:extLst>
               <a:ext uri="{FF2B5EF4-FFF2-40B4-BE49-F238E27FC236}">
-                <a16:creationId xmlns:a16="http://schemas.microsoft.com/office/drawing/2014/main" xmlns="" id="{538A5910-6C9B-1F48-8812-ECC4A33F6A21}"/>
+                <a16:creationId xmlns:a16="http://schemas.microsoft.com/office/drawing/2014/main" id="{538A5910-6C9B-1F48-8812-ECC4A33F6A21}"/>
               </a:ext>
             </a:extLst>
           </p:cNvPr>
@@ -766,38 +767,37 @@
           <a:p>
             <a:pPr lvl="0"/>
             <a:r>
-              <a:rPr lang="en-US" smtClean="0"/>
+              <a:rPr lang="en-US"/>
               <a:t>Click to edit Master text styles</a:t>
             </a:r>
           </a:p>
           <a:p>
             <a:pPr lvl="1"/>
             <a:r>
-              <a:rPr lang="en-US" smtClean="0"/>
+              <a:rPr lang="en-US"/>
               <a:t>Second level</a:t>
             </a:r>
           </a:p>
           <a:p>
             <a:pPr lvl="2"/>
             <a:r>
-              <a:rPr lang="en-US" smtClean="0"/>
+              <a:rPr lang="en-US"/>
               <a:t>Third level</a:t>
             </a:r>
           </a:p>
           <a:p>
             <a:pPr lvl="3"/>
             <a:r>
-              <a:rPr lang="en-US" smtClean="0"/>
+              <a:rPr lang="en-US"/>
               <a:t>Fourth level</a:t>
             </a:r>
           </a:p>
           <a:p>
             <a:pPr lvl="4"/>
             <a:r>
-              <a:rPr lang="en-US" smtClean="0"/>
+              <a:rPr lang="en-US"/>
               <a:t>Fifth level</a:t>
             </a:r>
-            <a:endParaRPr lang="en-US"/>
           </a:p>
         </p:txBody>
       </p:sp>
@@ -806,7 +806,7 @@
           <p:cNvPr id="4" name="Date Placeholder 3">
             <a:extLst>
               <a:ext uri="{FF2B5EF4-FFF2-40B4-BE49-F238E27FC236}">
-                <a16:creationId xmlns:a16="http://schemas.microsoft.com/office/drawing/2014/main" xmlns="" id="{36EAF42E-65C6-9945-BE49-EB50D6713838}"/>
+                <a16:creationId xmlns:a16="http://schemas.microsoft.com/office/drawing/2014/main" id="{36EAF42E-65C6-9945-BE49-EB50D6713838}"/>
               </a:ext>
             </a:extLst>
           </p:cNvPr>
@@ -832,7 +832,7 @@
           <a:p>
             <a:fld id="{2F93E591-CC8D-C74E-8EED-098A7FB5E64D}" type="datetime1">
               <a:rPr lang="en-CA" smtClean="0"/>
-              <a:t>2020-06-07</a:t>
+              <a:t>2020-06-08</a:t>
             </a:fld>
             <a:endParaRPr lang="en-US"/>
           </a:p>
@@ -843,7 +843,7 @@
           <p:cNvPr id="5" name="Footer Placeholder 4">
             <a:extLst>
               <a:ext uri="{FF2B5EF4-FFF2-40B4-BE49-F238E27FC236}">
-                <a16:creationId xmlns:a16="http://schemas.microsoft.com/office/drawing/2014/main" xmlns="" id="{255EF138-5D7E-EE45-A145-963FACA62E6A}"/>
+                <a16:creationId xmlns:a16="http://schemas.microsoft.com/office/drawing/2014/main" id="{255EF138-5D7E-EE45-A145-963FACA62E6A}"/>
               </a:ext>
             </a:extLst>
           </p:cNvPr>
@@ -879,7 +879,7 @@
           <p:cNvPr id="6" name="Slide Number Placeholder 5">
             <a:extLst>
               <a:ext uri="{FF2B5EF4-FFF2-40B4-BE49-F238E27FC236}">
-                <a16:creationId xmlns:a16="http://schemas.microsoft.com/office/drawing/2014/main" xmlns="" id="{43FF53AE-A2BC-DE4D-BB61-40C1BC3B64FB}"/>
+                <a16:creationId xmlns:a16="http://schemas.microsoft.com/office/drawing/2014/main" id="{43FF53AE-A2BC-DE4D-BB61-40C1BC3B64FB}"/>
               </a:ext>
             </a:extLst>
           </p:cNvPr>
@@ -916,7 +916,7 @@
           <p:cNvPr id="7" name="Picture 6">
             <a:extLst>
               <a:ext uri="{FF2B5EF4-FFF2-40B4-BE49-F238E27FC236}">
-                <a16:creationId xmlns:a16="http://schemas.microsoft.com/office/drawing/2014/main" xmlns="" id="{296536F3-C8D2-4944-B4D4-6A4C8563FAC8}"/>
+                <a16:creationId xmlns:a16="http://schemas.microsoft.com/office/drawing/2014/main" id="{296536F3-C8D2-4944-B4D4-6A4C8563FAC8}"/>
               </a:ext>
             </a:extLst>
           </p:cNvPr>
@@ -976,7 +976,7 @@
           <p:cNvPr id="2" name="Vertical Title 1">
             <a:extLst>
               <a:ext uri="{FF2B5EF4-FFF2-40B4-BE49-F238E27FC236}">
-                <a16:creationId xmlns:a16="http://schemas.microsoft.com/office/drawing/2014/main" xmlns="" id="{500FF282-7893-604E-9578-505C40B7157B}"/>
+                <a16:creationId xmlns:a16="http://schemas.microsoft.com/office/drawing/2014/main" id="{500FF282-7893-604E-9578-505C40B7157B}"/>
               </a:ext>
             </a:extLst>
           </p:cNvPr>
@@ -1001,10 +1001,9 @@
           <a:lstStyle/>
           <a:p>
             <a:r>
-              <a:rPr lang="en-US" smtClean="0"/>
+              <a:rPr lang="en-US"/>
               <a:t>Click to edit Master title style</a:t>
             </a:r>
-            <a:endParaRPr lang="en-US"/>
           </a:p>
         </p:txBody>
       </p:sp>
@@ -1013,7 +1012,7 @@
           <p:cNvPr id="3" name="Vertical Text Placeholder 2">
             <a:extLst>
               <a:ext uri="{FF2B5EF4-FFF2-40B4-BE49-F238E27FC236}">
-                <a16:creationId xmlns:a16="http://schemas.microsoft.com/office/drawing/2014/main" xmlns="" id="{7CA972C3-333E-304A-AB27-C6CDCBED1A76}"/>
+                <a16:creationId xmlns:a16="http://schemas.microsoft.com/office/drawing/2014/main" id="{7CA972C3-333E-304A-AB27-C6CDCBED1A76}"/>
               </a:ext>
             </a:extLst>
           </p:cNvPr>
@@ -1036,38 +1035,37 @@
           <a:p>
             <a:pPr lvl="0"/>
             <a:r>
-              <a:rPr lang="en-US" smtClean="0"/>
+              <a:rPr lang="en-US"/>
               <a:t>Click to edit Master text styles</a:t>
             </a:r>
           </a:p>
           <a:p>
             <a:pPr lvl="1"/>
             <a:r>
-              <a:rPr lang="en-US" smtClean="0"/>
+              <a:rPr lang="en-US"/>
               <a:t>Second level</a:t>
             </a:r>
           </a:p>
           <a:p>
             <a:pPr lvl="2"/>
             <a:r>
-              <a:rPr lang="en-US" smtClean="0"/>
+              <a:rPr lang="en-US"/>
               <a:t>Third level</a:t>
             </a:r>
           </a:p>
           <a:p>
             <a:pPr lvl="3"/>
             <a:r>
-              <a:rPr lang="en-US" smtClean="0"/>
+              <a:rPr lang="en-US"/>
               <a:t>Fourth level</a:t>
             </a:r>
           </a:p>
           <a:p>
             <a:pPr lvl="4"/>
             <a:r>
-              <a:rPr lang="en-US" smtClean="0"/>
+              <a:rPr lang="en-US"/>
               <a:t>Fifth level</a:t>
             </a:r>
-            <a:endParaRPr lang="en-US"/>
           </a:p>
         </p:txBody>
       </p:sp>
@@ -1076,7 +1074,7 @@
           <p:cNvPr id="4" name="Date Placeholder 3">
             <a:extLst>
               <a:ext uri="{FF2B5EF4-FFF2-40B4-BE49-F238E27FC236}">
-                <a16:creationId xmlns:a16="http://schemas.microsoft.com/office/drawing/2014/main" xmlns="" id="{389F7E9A-773D-734B-9080-4E50327633D7}"/>
+                <a16:creationId xmlns:a16="http://schemas.microsoft.com/office/drawing/2014/main" id="{389F7E9A-773D-734B-9080-4E50327633D7}"/>
               </a:ext>
             </a:extLst>
           </p:cNvPr>
@@ -1102,7 +1100,7 @@
           <a:p>
             <a:fld id="{2E1BC118-574D-594E-ABEA-A7C82666C9AB}" type="datetime1">
               <a:rPr lang="en-CA" smtClean="0"/>
-              <a:t>2020-06-07</a:t>
+              <a:t>2020-06-08</a:t>
             </a:fld>
             <a:endParaRPr lang="en-US"/>
           </a:p>
@@ -1113,7 +1111,7 @@
           <p:cNvPr id="5" name="Footer Placeholder 4">
             <a:extLst>
               <a:ext uri="{FF2B5EF4-FFF2-40B4-BE49-F238E27FC236}">
-                <a16:creationId xmlns:a16="http://schemas.microsoft.com/office/drawing/2014/main" xmlns="" id="{B3582C37-09FF-6A4D-8C32-64A7F07F2945}"/>
+                <a16:creationId xmlns:a16="http://schemas.microsoft.com/office/drawing/2014/main" id="{B3582C37-09FF-6A4D-8C32-64A7F07F2945}"/>
               </a:ext>
             </a:extLst>
           </p:cNvPr>
@@ -1149,7 +1147,7 @@
           <p:cNvPr id="6" name="Slide Number Placeholder 5">
             <a:extLst>
               <a:ext uri="{FF2B5EF4-FFF2-40B4-BE49-F238E27FC236}">
-                <a16:creationId xmlns:a16="http://schemas.microsoft.com/office/drawing/2014/main" xmlns="" id="{3BDB5B9D-9935-CE4E-A40E-BBED3145DF40}"/>
+                <a16:creationId xmlns:a16="http://schemas.microsoft.com/office/drawing/2014/main" id="{3BDB5B9D-9935-CE4E-A40E-BBED3145DF40}"/>
               </a:ext>
             </a:extLst>
           </p:cNvPr>
@@ -1186,7 +1184,7 @@
           <p:cNvPr id="8" name="Picture 7">
             <a:extLst>
               <a:ext uri="{FF2B5EF4-FFF2-40B4-BE49-F238E27FC236}">
-                <a16:creationId xmlns:a16="http://schemas.microsoft.com/office/drawing/2014/main" xmlns="" id="{24F9CC3B-F1C2-024E-9BCF-1306C0AC80DE}"/>
+                <a16:creationId xmlns:a16="http://schemas.microsoft.com/office/drawing/2014/main" id="{24F9CC3B-F1C2-024E-9BCF-1306C0AC80DE}"/>
               </a:ext>
             </a:extLst>
           </p:cNvPr>
@@ -1246,7 +1244,7 @@
           <p:cNvPr id="2" name="Title 1">
             <a:extLst>
               <a:ext uri="{FF2B5EF4-FFF2-40B4-BE49-F238E27FC236}">
-                <a16:creationId xmlns:a16="http://schemas.microsoft.com/office/drawing/2014/main" xmlns="" id="{CC4C7C6D-3AF4-704E-BA3F-6FC5B568CAB1}"/>
+                <a16:creationId xmlns:a16="http://schemas.microsoft.com/office/drawing/2014/main" id="{CC4C7C6D-3AF4-704E-BA3F-6FC5B568CAB1}"/>
               </a:ext>
             </a:extLst>
           </p:cNvPr>
@@ -1271,10 +1269,9 @@
           <a:lstStyle/>
           <a:p>
             <a:r>
-              <a:rPr lang="en-US" smtClean="0"/>
+              <a:rPr lang="en-US"/>
               <a:t>Click to edit Master title style</a:t>
             </a:r>
-            <a:endParaRPr lang="en-US"/>
           </a:p>
         </p:txBody>
       </p:sp>
@@ -1283,7 +1280,7 @@
           <p:cNvPr id="3" name="Content Placeholder 2">
             <a:extLst>
               <a:ext uri="{FF2B5EF4-FFF2-40B4-BE49-F238E27FC236}">
-                <a16:creationId xmlns:a16="http://schemas.microsoft.com/office/drawing/2014/main" xmlns="" id="{540F4F71-1642-7C4D-949F-4818DFEAE676}"/>
+                <a16:creationId xmlns:a16="http://schemas.microsoft.com/office/drawing/2014/main" id="{540F4F71-1642-7C4D-949F-4818DFEAE676}"/>
               </a:ext>
             </a:extLst>
           </p:cNvPr>
@@ -1301,38 +1298,37 @@
           <a:p>
             <a:pPr lvl="0"/>
             <a:r>
-              <a:rPr lang="en-US" smtClean="0"/>
+              <a:rPr lang="en-US"/>
               <a:t>Click to edit Master text styles</a:t>
             </a:r>
           </a:p>
           <a:p>
             <a:pPr lvl="1"/>
             <a:r>
-              <a:rPr lang="en-US" smtClean="0"/>
+              <a:rPr lang="en-US"/>
               <a:t>Second level</a:t>
             </a:r>
           </a:p>
           <a:p>
             <a:pPr lvl="2"/>
             <a:r>
-              <a:rPr lang="en-US" smtClean="0"/>
+              <a:rPr lang="en-US"/>
               <a:t>Third level</a:t>
             </a:r>
           </a:p>
           <a:p>
             <a:pPr lvl="3"/>
             <a:r>
-              <a:rPr lang="en-US" smtClean="0"/>
+              <a:rPr lang="en-US"/>
               <a:t>Fourth level</a:t>
             </a:r>
           </a:p>
           <a:p>
             <a:pPr lvl="4"/>
             <a:r>
-              <a:rPr lang="en-US" smtClean="0"/>
+              <a:rPr lang="en-US"/>
               <a:t>Fifth level</a:t>
             </a:r>
-            <a:endParaRPr lang="en-US"/>
           </a:p>
         </p:txBody>
       </p:sp>
@@ -1341,7 +1337,7 @@
           <p:cNvPr id="5" name="Footer Placeholder 4">
             <a:extLst>
               <a:ext uri="{FF2B5EF4-FFF2-40B4-BE49-F238E27FC236}">
-                <a16:creationId xmlns:a16="http://schemas.microsoft.com/office/drawing/2014/main" xmlns="" id="{A9BE4CE4-F196-BF4E-8EF4-267B94BD700F}"/>
+                <a16:creationId xmlns:a16="http://schemas.microsoft.com/office/drawing/2014/main" id="{A9BE4CE4-F196-BF4E-8EF4-267B94BD700F}"/>
               </a:ext>
             </a:extLst>
           </p:cNvPr>
@@ -1377,7 +1373,7 @@
           <p:cNvPr id="6" name="Slide Number Placeholder 5">
             <a:extLst>
               <a:ext uri="{FF2B5EF4-FFF2-40B4-BE49-F238E27FC236}">
-                <a16:creationId xmlns:a16="http://schemas.microsoft.com/office/drawing/2014/main" xmlns="" id="{B7BCB4A0-D1FD-9244-BC2D-7164B631071E}"/>
+                <a16:creationId xmlns:a16="http://schemas.microsoft.com/office/drawing/2014/main" id="{B7BCB4A0-D1FD-9244-BC2D-7164B631071E}"/>
               </a:ext>
             </a:extLst>
           </p:cNvPr>
@@ -1414,7 +1410,7 @@
           <p:cNvPr id="7" name="Picture 6">
             <a:extLst>
               <a:ext uri="{FF2B5EF4-FFF2-40B4-BE49-F238E27FC236}">
-                <a16:creationId xmlns:a16="http://schemas.microsoft.com/office/drawing/2014/main" xmlns="" id="{217370EC-1423-5441-922D-1AAFD5BB3120}"/>
+                <a16:creationId xmlns:a16="http://schemas.microsoft.com/office/drawing/2014/main" id="{217370EC-1423-5441-922D-1AAFD5BB3120}"/>
               </a:ext>
             </a:extLst>
           </p:cNvPr>
@@ -1444,7 +1440,7 @@
           <p:cNvPr id="8" name="Date Placeholder 3">
             <a:extLst>
               <a:ext uri="{FF2B5EF4-FFF2-40B4-BE49-F238E27FC236}">
-                <a16:creationId xmlns:a16="http://schemas.microsoft.com/office/drawing/2014/main" xmlns="" id="{6EF411AF-3106-D04E-9818-E4C0FD06B923}"/>
+                <a16:creationId xmlns:a16="http://schemas.microsoft.com/office/drawing/2014/main" id="{6EF411AF-3106-D04E-9818-E4C0FD06B923}"/>
               </a:ext>
             </a:extLst>
           </p:cNvPr>
@@ -1470,7 +1466,7 @@
           <a:p>
             <a:fld id="{B929AB1E-7FD9-0A40-B7C0-508CCACB3E9A}" type="datetime1">
               <a:rPr lang="en-CA" smtClean="0"/>
-              <a:t>2020-06-07</a:t>
+              <a:t>2020-06-08</a:t>
             </a:fld>
             <a:endParaRPr lang="en-US"/>
           </a:p>
@@ -1511,7 +1507,7 @@
           <p:cNvPr id="2" name="Title 1">
             <a:extLst>
               <a:ext uri="{FF2B5EF4-FFF2-40B4-BE49-F238E27FC236}">
-                <a16:creationId xmlns:a16="http://schemas.microsoft.com/office/drawing/2014/main" xmlns="" id="{418AD314-C4FC-384A-835E-A6FA7C1C341E}"/>
+                <a16:creationId xmlns:a16="http://schemas.microsoft.com/office/drawing/2014/main" id="{418AD314-C4FC-384A-835E-A6FA7C1C341E}"/>
               </a:ext>
             </a:extLst>
           </p:cNvPr>
@@ -1540,10 +1536,9 @@
           </a:lstStyle>
           <a:p>
             <a:r>
-              <a:rPr lang="en-US" smtClean="0"/>
+              <a:rPr lang="en-US"/>
               <a:t>Click to edit Master title style</a:t>
             </a:r>
-            <a:endParaRPr lang="en-US"/>
           </a:p>
         </p:txBody>
       </p:sp>
@@ -1552,7 +1547,7 @@
           <p:cNvPr id="3" name="Text Placeholder 2">
             <a:extLst>
               <a:ext uri="{FF2B5EF4-FFF2-40B4-BE49-F238E27FC236}">
-                <a16:creationId xmlns:a16="http://schemas.microsoft.com/office/drawing/2014/main" xmlns="" id="{D8195E31-AF4D-A348-A7A9-7416D5CFB304}"/>
+                <a16:creationId xmlns:a16="http://schemas.microsoft.com/office/drawing/2014/main" id="{D8195E31-AF4D-A348-A7A9-7416D5CFB304}"/>
               </a:ext>
             </a:extLst>
           </p:cNvPr>
@@ -1666,7 +1661,7 @@
           <a:p>
             <a:pPr lvl="0"/>
             <a:r>
-              <a:rPr lang="en-US" smtClean="0"/>
+              <a:rPr lang="en-US"/>
               <a:t>Click to edit Master text styles</a:t>
             </a:r>
           </a:p>
@@ -1677,7 +1672,7 @@
           <p:cNvPr id="4" name="Date Placeholder 3">
             <a:extLst>
               <a:ext uri="{FF2B5EF4-FFF2-40B4-BE49-F238E27FC236}">
-                <a16:creationId xmlns:a16="http://schemas.microsoft.com/office/drawing/2014/main" xmlns="" id="{073CCF5D-D219-B446-BFBF-42479CD05457}"/>
+                <a16:creationId xmlns:a16="http://schemas.microsoft.com/office/drawing/2014/main" id="{073CCF5D-D219-B446-BFBF-42479CD05457}"/>
               </a:ext>
             </a:extLst>
           </p:cNvPr>
@@ -1703,7 +1698,7 @@
           <a:p>
             <a:fld id="{5AE8723F-57EA-4C47-97B9-92AFDEEF85DC}" type="datetime1">
               <a:rPr lang="en-CA" smtClean="0"/>
-              <a:t>2020-06-07</a:t>
+              <a:t>2020-06-08</a:t>
             </a:fld>
             <a:endParaRPr lang="en-US"/>
           </a:p>
@@ -1714,7 +1709,7 @@
           <p:cNvPr id="5" name="Footer Placeholder 4">
             <a:extLst>
               <a:ext uri="{FF2B5EF4-FFF2-40B4-BE49-F238E27FC236}">
-                <a16:creationId xmlns:a16="http://schemas.microsoft.com/office/drawing/2014/main" xmlns="" id="{FC3BE2F7-A02E-2541-92F4-BB12DCEA2341}"/>
+                <a16:creationId xmlns:a16="http://schemas.microsoft.com/office/drawing/2014/main" id="{FC3BE2F7-A02E-2541-92F4-BB12DCEA2341}"/>
               </a:ext>
             </a:extLst>
           </p:cNvPr>
@@ -1750,7 +1745,7 @@
           <p:cNvPr id="6" name="Slide Number Placeholder 5">
             <a:extLst>
               <a:ext uri="{FF2B5EF4-FFF2-40B4-BE49-F238E27FC236}">
-                <a16:creationId xmlns:a16="http://schemas.microsoft.com/office/drawing/2014/main" xmlns="" id="{66E5E475-C185-8649-99DC-91A32B80F67D}"/>
+                <a16:creationId xmlns:a16="http://schemas.microsoft.com/office/drawing/2014/main" id="{66E5E475-C185-8649-99DC-91A32B80F67D}"/>
               </a:ext>
             </a:extLst>
           </p:cNvPr>
@@ -1787,7 +1782,7 @@
           <p:cNvPr id="7" name="Picture 6">
             <a:extLst>
               <a:ext uri="{FF2B5EF4-FFF2-40B4-BE49-F238E27FC236}">
-                <a16:creationId xmlns:a16="http://schemas.microsoft.com/office/drawing/2014/main" xmlns="" id="{204E7543-36A1-9145-8718-DCB0BDDD9F30}"/>
+                <a16:creationId xmlns:a16="http://schemas.microsoft.com/office/drawing/2014/main" id="{204E7543-36A1-9145-8718-DCB0BDDD9F30}"/>
               </a:ext>
             </a:extLst>
           </p:cNvPr>
@@ -1847,7 +1842,7 @@
           <p:cNvPr id="2" name="Title 1">
             <a:extLst>
               <a:ext uri="{FF2B5EF4-FFF2-40B4-BE49-F238E27FC236}">
-                <a16:creationId xmlns:a16="http://schemas.microsoft.com/office/drawing/2014/main" xmlns="" id="{7EB1F69A-4335-4B4E-B747-17F37F3C2C99}"/>
+                <a16:creationId xmlns:a16="http://schemas.microsoft.com/office/drawing/2014/main" id="{7EB1F69A-4335-4B4E-B747-17F37F3C2C99}"/>
               </a:ext>
             </a:extLst>
           </p:cNvPr>
@@ -1872,10 +1867,9 @@
           <a:lstStyle/>
           <a:p>
             <a:r>
-              <a:rPr lang="en-US" smtClean="0"/>
+              <a:rPr lang="en-US"/>
               <a:t>Click to edit Master title style</a:t>
             </a:r>
-            <a:endParaRPr lang="en-US"/>
           </a:p>
         </p:txBody>
       </p:sp>
@@ -1884,7 +1878,7 @@
           <p:cNvPr id="3" name="Content Placeholder 2">
             <a:extLst>
               <a:ext uri="{FF2B5EF4-FFF2-40B4-BE49-F238E27FC236}">
-                <a16:creationId xmlns:a16="http://schemas.microsoft.com/office/drawing/2014/main" xmlns="" id="{FBB7619A-7211-0947-8360-23CE25F12D7E}"/>
+                <a16:creationId xmlns:a16="http://schemas.microsoft.com/office/drawing/2014/main" id="{FBB7619A-7211-0947-8360-23CE25F12D7E}"/>
               </a:ext>
             </a:extLst>
           </p:cNvPr>
@@ -1907,38 +1901,37 @@
           <a:p>
             <a:pPr lvl="0"/>
             <a:r>
-              <a:rPr lang="en-US" smtClean="0"/>
+              <a:rPr lang="en-US"/>
               <a:t>Click to edit Master text styles</a:t>
             </a:r>
           </a:p>
           <a:p>
             <a:pPr lvl="1"/>
             <a:r>
-              <a:rPr lang="en-US" smtClean="0"/>
+              <a:rPr lang="en-US"/>
               <a:t>Second level</a:t>
             </a:r>
           </a:p>
           <a:p>
             <a:pPr lvl="2"/>
             <a:r>
-              <a:rPr lang="en-US" smtClean="0"/>
+              <a:rPr lang="en-US"/>
               <a:t>Third level</a:t>
             </a:r>
           </a:p>
           <a:p>
             <a:pPr lvl="3"/>
             <a:r>
-              <a:rPr lang="en-US" smtClean="0"/>
+              <a:rPr lang="en-US"/>
               <a:t>Fourth level</a:t>
             </a:r>
           </a:p>
           <a:p>
             <a:pPr lvl="4"/>
             <a:r>
-              <a:rPr lang="en-US" smtClean="0"/>
+              <a:rPr lang="en-US"/>
               <a:t>Fifth level</a:t>
             </a:r>
-            <a:endParaRPr lang="en-US"/>
           </a:p>
         </p:txBody>
       </p:sp>
@@ -1947,7 +1940,7 @@
           <p:cNvPr id="4" name="Content Placeholder 3">
             <a:extLst>
               <a:ext uri="{FF2B5EF4-FFF2-40B4-BE49-F238E27FC236}">
-                <a16:creationId xmlns:a16="http://schemas.microsoft.com/office/drawing/2014/main" xmlns="" id="{F0A2284B-15A7-584D-908E-45543479E59F}"/>
+                <a16:creationId xmlns:a16="http://schemas.microsoft.com/office/drawing/2014/main" id="{F0A2284B-15A7-584D-908E-45543479E59F}"/>
               </a:ext>
             </a:extLst>
           </p:cNvPr>
@@ -1970,38 +1963,37 @@
           <a:p>
             <a:pPr lvl="0"/>
             <a:r>
-              <a:rPr lang="en-US" smtClean="0"/>
+              <a:rPr lang="en-US"/>
               <a:t>Click to edit Master text styles</a:t>
             </a:r>
           </a:p>
           <a:p>
             <a:pPr lvl="1"/>
             <a:r>
-              <a:rPr lang="en-US" smtClean="0"/>
+              <a:rPr lang="en-US"/>
               <a:t>Second level</a:t>
             </a:r>
           </a:p>
           <a:p>
             <a:pPr lvl="2"/>
             <a:r>
-              <a:rPr lang="en-US" smtClean="0"/>
+              <a:rPr lang="en-US"/>
               <a:t>Third level</a:t>
             </a:r>
           </a:p>
           <a:p>
             <a:pPr lvl="3"/>
             <a:r>
-              <a:rPr lang="en-US" smtClean="0"/>
+              <a:rPr lang="en-US"/>
               <a:t>Fourth level</a:t>
             </a:r>
           </a:p>
           <a:p>
             <a:pPr lvl="4"/>
             <a:r>
-              <a:rPr lang="en-US" smtClean="0"/>
+              <a:rPr lang="en-US"/>
               <a:t>Fifth level</a:t>
             </a:r>
-            <a:endParaRPr lang="en-US"/>
           </a:p>
         </p:txBody>
       </p:sp>
@@ -2010,7 +2002,7 @@
           <p:cNvPr id="5" name="Date Placeholder 4">
             <a:extLst>
               <a:ext uri="{FF2B5EF4-FFF2-40B4-BE49-F238E27FC236}">
-                <a16:creationId xmlns:a16="http://schemas.microsoft.com/office/drawing/2014/main" xmlns="" id="{71848B25-655D-AF40-BDC0-5457413735FF}"/>
+                <a16:creationId xmlns:a16="http://schemas.microsoft.com/office/drawing/2014/main" id="{71848B25-655D-AF40-BDC0-5457413735FF}"/>
               </a:ext>
             </a:extLst>
           </p:cNvPr>
@@ -2036,7 +2028,7 @@
           <a:p>
             <a:fld id="{B2B00E5D-EC04-AA49-8D52-0FCB6E08F63D}" type="datetime1">
               <a:rPr lang="en-CA" smtClean="0"/>
-              <a:t>2020-06-07</a:t>
+              <a:t>2020-06-08</a:t>
             </a:fld>
             <a:endParaRPr lang="en-US"/>
           </a:p>
@@ -2047,7 +2039,7 @@
           <p:cNvPr id="6" name="Footer Placeholder 5">
             <a:extLst>
               <a:ext uri="{FF2B5EF4-FFF2-40B4-BE49-F238E27FC236}">
-                <a16:creationId xmlns:a16="http://schemas.microsoft.com/office/drawing/2014/main" xmlns="" id="{F719A9F6-1429-5E49-BAA4-1E84DC5BA7FF}"/>
+                <a16:creationId xmlns:a16="http://schemas.microsoft.com/office/drawing/2014/main" id="{F719A9F6-1429-5E49-BAA4-1E84DC5BA7FF}"/>
               </a:ext>
             </a:extLst>
           </p:cNvPr>
@@ -2083,7 +2075,7 @@
           <p:cNvPr id="7" name="Slide Number Placeholder 6">
             <a:extLst>
               <a:ext uri="{FF2B5EF4-FFF2-40B4-BE49-F238E27FC236}">
-                <a16:creationId xmlns:a16="http://schemas.microsoft.com/office/drawing/2014/main" xmlns="" id="{81093763-BF3C-C644-9F21-D1290C7860FF}"/>
+                <a16:creationId xmlns:a16="http://schemas.microsoft.com/office/drawing/2014/main" id="{81093763-BF3C-C644-9F21-D1290C7860FF}"/>
               </a:ext>
             </a:extLst>
           </p:cNvPr>
@@ -2120,7 +2112,7 @@
           <p:cNvPr id="8" name="Picture 7">
             <a:extLst>
               <a:ext uri="{FF2B5EF4-FFF2-40B4-BE49-F238E27FC236}">
-                <a16:creationId xmlns:a16="http://schemas.microsoft.com/office/drawing/2014/main" xmlns="" id="{8E5401E6-623E-8449-A07B-6B5E2253AD21}"/>
+                <a16:creationId xmlns:a16="http://schemas.microsoft.com/office/drawing/2014/main" id="{8E5401E6-623E-8449-A07B-6B5E2253AD21}"/>
               </a:ext>
             </a:extLst>
           </p:cNvPr>
@@ -2180,7 +2172,7 @@
           <p:cNvPr id="2" name="Title 1">
             <a:extLst>
               <a:ext uri="{FF2B5EF4-FFF2-40B4-BE49-F238E27FC236}">
-                <a16:creationId xmlns:a16="http://schemas.microsoft.com/office/drawing/2014/main" xmlns="" id="{3D43ABBC-6A16-9A46-A02F-79A517A30DA7}"/>
+                <a16:creationId xmlns:a16="http://schemas.microsoft.com/office/drawing/2014/main" id="{3D43ABBC-6A16-9A46-A02F-79A517A30DA7}"/>
               </a:ext>
             </a:extLst>
           </p:cNvPr>
@@ -2205,10 +2197,9 @@
           <a:lstStyle/>
           <a:p>
             <a:r>
-              <a:rPr lang="en-US" smtClean="0"/>
+              <a:rPr lang="en-US"/>
               <a:t>Click to edit Master title style</a:t>
             </a:r>
-            <a:endParaRPr lang="en-US"/>
           </a:p>
         </p:txBody>
       </p:sp>
@@ -2217,7 +2208,7 @@
           <p:cNvPr id="3" name="Text Placeholder 2">
             <a:extLst>
               <a:ext uri="{FF2B5EF4-FFF2-40B4-BE49-F238E27FC236}">
-                <a16:creationId xmlns:a16="http://schemas.microsoft.com/office/drawing/2014/main" xmlns="" id="{781AB855-CE44-1647-A11E-35810E458425}"/>
+                <a16:creationId xmlns:a16="http://schemas.microsoft.com/office/drawing/2014/main" id="{781AB855-CE44-1647-A11E-35810E458425}"/>
               </a:ext>
             </a:extLst>
           </p:cNvPr>
@@ -2277,7 +2268,7 @@
           <a:p>
             <a:pPr lvl="0"/>
             <a:r>
-              <a:rPr lang="en-US" smtClean="0"/>
+              <a:rPr lang="en-US"/>
               <a:t>Click to edit Master text styles</a:t>
             </a:r>
           </a:p>
@@ -2288,7 +2279,7 @@
           <p:cNvPr id="4" name="Content Placeholder 3">
             <a:extLst>
               <a:ext uri="{FF2B5EF4-FFF2-40B4-BE49-F238E27FC236}">
-                <a16:creationId xmlns:a16="http://schemas.microsoft.com/office/drawing/2014/main" xmlns="" id="{3A7E1739-9BD2-114D-9001-9767690E3B07}"/>
+                <a16:creationId xmlns:a16="http://schemas.microsoft.com/office/drawing/2014/main" id="{3A7E1739-9BD2-114D-9001-9767690E3B07}"/>
               </a:ext>
             </a:extLst>
           </p:cNvPr>
@@ -2311,38 +2302,37 @@
           <a:p>
             <a:pPr lvl="0"/>
             <a:r>
-              <a:rPr lang="en-US" smtClean="0"/>
+              <a:rPr lang="en-US"/>
               <a:t>Click to edit Master text styles</a:t>
             </a:r>
           </a:p>
           <a:p>
             <a:pPr lvl="1"/>
             <a:r>
-              <a:rPr lang="en-US" smtClean="0"/>
+              <a:rPr lang="en-US"/>
               <a:t>Second level</a:t>
             </a:r>
           </a:p>
           <a:p>
             <a:pPr lvl="2"/>
             <a:r>
-              <a:rPr lang="en-US" smtClean="0"/>
+              <a:rPr lang="en-US"/>
               <a:t>Third level</a:t>
             </a:r>
           </a:p>
           <a:p>
             <a:pPr lvl="3"/>
             <a:r>
-              <a:rPr lang="en-US" smtClean="0"/>
+              <a:rPr lang="en-US"/>
               <a:t>Fourth level</a:t>
             </a:r>
           </a:p>
           <a:p>
             <a:pPr lvl="4"/>
             <a:r>
-              <a:rPr lang="en-US" smtClean="0"/>
+              <a:rPr lang="en-US"/>
               <a:t>Fifth level</a:t>
             </a:r>
-            <a:endParaRPr lang="en-US"/>
           </a:p>
         </p:txBody>
       </p:sp>
@@ -2351,7 +2341,7 @@
           <p:cNvPr id="5" name="Text Placeholder 4">
             <a:extLst>
               <a:ext uri="{FF2B5EF4-FFF2-40B4-BE49-F238E27FC236}">
-                <a16:creationId xmlns:a16="http://schemas.microsoft.com/office/drawing/2014/main" xmlns="" id="{EF8260CC-435F-4B4A-921E-F825D9DAFD48}"/>
+                <a16:creationId xmlns:a16="http://schemas.microsoft.com/office/drawing/2014/main" id="{EF8260CC-435F-4B4A-921E-F825D9DAFD48}"/>
               </a:ext>
             </a:extLst>
           </p:cNvPr>
@@ -2411,7 +2401,7 @@
           <a:p>
             <a:pPr lvl="0"/>
             <a:r>
-              <a:rPr lang="en-US" smtClean="0"/>
+              <a:rPr lang="en-US"/>
               <a:t>Click to edit Master text styles</a:t>
             </a:r>
           </a:p>
@@ -2422,7 +2412,7 @@
           <p:cNvPr id="6" name="Content Placeholder 5">
             <a:extLst>
               <a:ext uri="{FF2B5EF4-FFF2-40B4-BE49-F238E27FC236}">
-                <a16:creationId xmlns:a16="http://schemas.microsoft.com/office/drawing/2014/main" xmlns="" id="{A5E7B3BE-4412-2546-8A83-8211EDE2FD85}"/>
+                <a16:creationId xmlns:a16="http://schemas.microsoft.com/office/drawing/2014/main" id="{A5E7B3BE-4412-2546-8A83-8211EDE2FD85}"/>
               </a:ext>
             </a:extLst>
           </p:cNvPr>
@@ -2445,35 +2435,35 @@
           <a:p>
             <a:pPr lvl="0"/>
             <a:r>
-              <a:rPr lang="en-US" smtClean="0"/>
+              <a:rPr lang="en-US"/>
               <a:t>Click to edit Master text styles</a:t>
             </a:r>
           </a:p>
           <a:p>
             <a:pPr lvl="1"/>
             <a:r>
-              <a:rPr lang="en-US" smtClean="0"/>
+              <a:rPr lang="en-US"/>
               <a:t>Second level</a:t>
             </a:r>
           </a:p>
           <a:p>
             <a:pPr lvl="2"/>
             <a:r>
-              <a:rPr lang="en-US" smtClean="0"/>
+              <a:rPr lang="en-US"/>
               <a:t>Third level</a:t>
             </a:r>
           </a:p>
           <a:p>
             <a:pPr lvl="3"/>
             <a:r>
-              <a:rPr lang="en-US" smtClean="0"/>
+              <a:rPr lang="en-US"/>
               <a:t>Fourth level</a:t>
             </a:r>
           </a:p>
           <a:p>
             <a:pPr lvl="4"/>
             <a:r>
-              <a:rPr lang="en-US" smtClean="0"/>
+              <a:rPr lang="en-US"/>
               <a:t>Fifth level</a:t>
             </a:r>
             <a:endParaRPr lang="en-US" dirty="0"/>
@@ -2485,7 +2475,7 @@
           <p:cNvPr id="7" name="Date Placeholder 6">
             <a:extLst>
               <a:ext uri="{FF2B5EF4-FFF2-40B4-BE49-F238E27FC236}">
-                <a16:creationId xmlns:a16="http://schemas.microsoft.com/office/drawing/2014/main" xmlns="" id="{F095F5D0-89F8-014F-8A54-42E462B42BBE}"/>
+                <a16:creationId xmlns:a16="http://schemas.microsoft.com/office/drawing/2014/main" id="{F095F5D0-89F8-014F-8A54-42E462B42BBE}"/>
               </a:ext>
             </a:extLst>
           </p:cNvPr>
@@ -2511,7 +2501,7 @@
           <a:p>
             <a:fld id="{FF90905C-10FF-8047-AA7E-6DC7E8B6AF51}" type="datetime1">
               <a:rPr lang="en-CA" smtClean="0"/>
-              <a:t>2020-06-07</a:t>
+              <a:t>2020-06-08</a:t>
             </a:fld>
             <a:endParaRPr lang="en-US"/>
           </a:p>
@@ -2522,7 +2512,7 @@
           <p:cNvPr id="8" name="Footer Placeholder 7">
             <a:extLst>
               <a:ext uri="{FF2B5EF4-FFF2-40B4-BE49-F238E27FC236}">
-                <a16:creationId xmlns:a16="http://schemas.microsoft.com/office/drawing/2014/main" xmlns="" id="{E7B91292-54C2-5B4B-BC92-96B7E584A6F5}"/>
+                <a16:creationId xmlns:a16="http://schemas.microsoft.com/office/drawing/2014/main" id="{E7B91292-54C2-5B4B-BC92-96B7E584A6F5}"/>
               </a:ext>
             </a:extLst>
           </p:cNvPr>
@@ -2558,7 +2548,7 @@
           <p:cNvPr id="9" name="Slide Number Placeholder 8">
             <a:extLst>
               <a:ext uri="{FF2B5EF4-FFF2-40B4-BE49-F238E27FC236}">
-                <a16:creationId xmlns:a16="http://schemas.microsoft.com/office/drawing/2014/main" xmlns="" id="{CAB02B02-7BBA-3248-9E8D-33B016832947}"/>
+                <a16:creationId xmlns:a16="http://schemas.microsoft.com/office/drawing/2014/main" id="{CAB02B02-7BBA-3248-9E8D-33B016832947}"/>
               </a:ext>
             </a:extLst>
           </p:cNvPr>
@@ -2595,7 +2585,7 @@
           <p:cNvPr id="10" name="Picture 9">
             <a:extLst>
               <a:ext uri="{FF2B5EF4-FFF2-40B4-BE49-F238E27FC236}">
-                <a16:creationId xmlns:a16="http://schemas.microsoft.com/office/drawing/2014/main" xmlns="" id="{388F359D-97AE-244A-B6E0-7FABE799CEF3}"/>
+                <a16:creationId xmlns:a16="http://schemas.microsoft.com/office/drawing/2014/main" id="{388F359D-97AE-244A-B6E0-7FABE799CEF3}"/>
               </a:ext>
             </a:extLst>
           </p:cNvPr>
@@ -2655,7 +2645,7 @@
           <p:cNvPr id="2" name="Title 1">
             <a:extLst>
               <a:ext uri="{FF2B5EF4-FFF2-40B4-BE49-F238E27FC236}">
-                <a16:creationId xmlns:a16="http://schemas.microsoft.com/office/drawing/2014/main" xmlns="" id="{4F5CA3E4-A9A0-B949-AB23-A7ED13D895F7}"/>
+                <a16:creationId xmlns:a16="http://schemas.microsoft.com/office/drawing/2014/main" id="{4F5CA3E4-A9A0-B949-AB23-A7ED13D895F7}"/>
               </a:ext>
             </a:extLst>
           </p:cNvPr>
@@ -2680,10 +2670,9 @@
           <a:lstStyle/>
           <a:p>
             <a:r>
-              <a:rPr lang="en-US" smtClean="0"/>
+              <a:rPr lang="en-US"/>
               <a:t>Click to edit Master title style</a:t>
             </a:r>
-            <a:endParaRPr lang="en-US"/>
           </a:p>
         </p:txBody>
       </p:sp>
@@ -2692,7 +2681,7 @@
           <p:cNvPr id="3" name="Date Placeholder 2">
             <a:extLst>
               <a:ext uri="{FF2B5EF4-FFF2-40B4-BE49-F238E27FC236}">
-                <a16:creationId xmlns:a16="http://schemas.microsoft.com/office/drawing/2014/main" xmlns="" id="{901C8F84-5DB4-5A45-850F-78308488EE3A}"/>
+                <a16:creationId xmlns:a16="http://schemas.microsoft.com/office/drawing/2014/main" id="{901C8F84-5DB4-5A45-850F-78308488EE3A}"/>
               </a:ext>
             </a:extLst>
           </p:cNvPr>
@@ -2718,7 +2707,7 @@
           <a:p>
             <a:fld id="{D1CE86E2-4400-D342-BEEC-F9C1ADF6F9F7}" type="datetime1">
               <a:rPr lang="en-CA" smtClean="0"/>
-              <a:t>2020-06-07</a:t>
+              <a:t>2020-06-08</a:t>
             </a:fld>
             <a:endParaRPr lang="en-US"/>
           </a:p>
@@ -2729,7 +2718,7 @@
           <p:cNvPr id="4" name="Footer Placeholder 3">
             <a:extLst>
               <a:ext uri="{FF2B5EF4-FFF2-40B4-BE49-F238E27FC236}">
-                <a16:creationId xmlns:a16="http://schemas.microsoft.com/office/drawing/2014/main" xmlns="" id="{74A30B16-8D2B-964B-A82E-A1D8E57827C0}"/>
+                <a16:creationId xmlns:a16="http://schemas.microsoft.com/office/drawing/2014/main" id="{74A30B16-8D2B-964B-A82E-A1D8E57827C0}"/>
               </a:ext>
             </a:extLst>
           </p:cNvPr>
@@ -2765,7 +2754,7 @@
           <p:cNvPr id="5" name="Slide Number Placeholder 4">
             <a:extLst>
               <a:ext uri="{FF2B5EF4-FFF2-40B4-BE49-F238E27FC236}">
-                <a16:creationId xmlns:a16="http://schemas.microsoft.com/office/drawing/2014/main" xmlns="" id="{76CEFDE2-192C-EB49-B93B-A5C074DE6AC1}"/>
+                <a16:creationId xmlns:a16="http://schemas.microsoft.com/office/drawing/2014/main" id="{76CEFDE2-192C-EB49-B93B-A5C074DE6AC1}"/>
               </a:ext>
             </a:extLst>
           </p:cNvPr>
@@ -2802,7 +2791,7 @@
           <p:cNvPr id="6" name="Picture 5">
             <a:extLst>
               <a:ext uri="{FF2B5EF4-FFF2-40B4-BE49-F238E27FC236}">
-                <a16:creationId xmlns:a16="http://schemas.microsoft.com/office/drawing/2014/main" xmlns="" id="{139864CA-5904-6E4C-94B5-D61D982EE8D8}"/>
+                <a16:creationId xmlns:a16="http://schemas.microsoft.com/office/drawing/2014/main" id="{139864CA-5904-6E4C-94B5-D61D982EE8D8}"/>
               </a:ext>
             </a:extLst>
           </p:cNvPr>
@@ -2862,7 +2851,7 @@
           <p:cNvPr id="2" name="Date Placeholder 1">
             <a:extLst>
               <a:ext uri="{FF2B5EF4-FFF2-40B4-BE49-F238E27FC236}">
-                <a16:creationId xmlns:a16="http://schemas.microsoft.com/office/drawing/2014/main" xmlns="" id="{BEB624B9-C01C-504E-A7E7-3945364DF69C}"/>
+                <a16:creationId xmlns:a16="http://schemas.microsoft.com/office/drawing/2014/main" id="{BEB624B9-C01C-504E-A7E7-3945364DF69C}"/>
               </a:ext>
             </a:extLst>
           </p:cNvPr>
@@ -2888,7 +2877,7 @@
           <a:p>
             <a:fld id="{74358A08-7221-7F45-8378-69D5559861DD}" type="datetime1">
               <a:rPr lang="en-CA" smtClean="0"/>
-              <a:t>2020-06-07</a:t>
+              <a:t>2020-06-08</a:t>
             </a:fld>
             <a:endParaRPr lang="en-US"/>
           </a:p>
@@ -2899,7 +2888,7 @@
           <p:cNvPr id="3" name="Footer Placeholder 2">
             <a:extLst>
               <a:ext uri="{FF2B5EF4-FFF2-40B4-BE49-F238E27FC236}">
-                <a16:creationId xmlns:a16="http://schemas.microsoft.com/office/drawing/2014/main" xmlns="" id="{1098282D-B315-7747-81EE-E8722A589D50}"/>
+                <a16:creationId xmlns:a16="http://schemas.microsoft.com/office/drawing/2014/main" id="{1098282D-B315-7747-81EE-E8722A589D50}"/>
               </a:ext>
             </a:extLst>
           </p:cNvPr>
@@ -2935,7 +2924,7 @@
           <p:cNvPr id="4" name="Slide Number Placeholder 3">
             <a:extLst>
               <a:ext uri="{FF2B5EF4-FFF2-40B4-BE49-F238E27FC236}">
-                <a16:creationId xmlns:a16="http://schemas.microsoft.com/office/drawing/2014/main" xmlns="" id="{9C3647E0-FF85-FA4D-A8FA-E44590C1165D}"/>
+                <a16:creationId xmlns:a16="http://schemas.microsoft.com/office/drawing/2014/main" id="{9C3647E0-FF85-FA4D-A8FA-E44590C1165D}"/>
               </a:ext>
             </a:extLst>
           </p:cNvPr>
@@ -2972,7 +2961,7 @@
           <p:cNvPr id="5" name="Picture 4">
             <a:extLst>
               <a:ext uri="{FF2B5EF4-FFF2-40B4-BE49-F238E27FC236}">
-                <a16:creationId xmlns:a16="http://schemas.microsoft.com/office/drawing/2014/main" xmlns="" id="{DDE5121D-E664-684B-8EE0-95412BB47572}"/>
+                <a16:creationId xmlns:a16="http://schemas.microsoft.com/office/drawing/2014/main" id="{DDE5121D-E664-684B-8EE0-95412BB47572}"/>
               </a:ext>
             </a:extLst>
           </p:cNvPr>
@@ -3032,7 +3021,7 @@
           <p:cNvPr id="2" name="Title 1">
             <a:extLst>
               <a:ext uri="{FF2B5EF4-FFF2-40B4-BE49-F238E27FC236}">
-                <a16:creationId xmlns:a16="http://schemas.microsoft.com/office/drawing/2014/main" xmlns="" id="{CBA68BCA-0D11-EE4D-9447-2FD49C0E2988}"/>
+                <a16:creationId xmlns:a16="http://schemas.microsoft.com/office/drawing/2014/main" id="{CBA68BCA-0D11-EE4D-9447-2FD49C0E2988}"/>
               </a:ext>
             </a:extLst>
           </p:cNvPr>
@@ -3061,7 +3050,7 @@
           </a:lstStyle>
           <a:p>
             <a:r>
-              <a:rPr lang="en-US" smtClean="0"/>
+              <a:rPr lang="en-US"/>
               <a:t>Click to edit Master title style</a:t>
             </a:r>
             <a:endParaRPr lang="en-US" dirty="0"/>
@@ -3073,7 +3062,7 @@
           <p:cNvPr id="3" name="Content Placeholder 2">
             <a:extLst>
               <a:ext uri="{FF2B5EF4-FFF2-40B4-BE49-F238E27FC236}">
-                <a16:creationId xmlns:a16="http://schemas.microsoft.com/office/drawing/2014/main" xmlns="" id="{914EC554-6BD0-D046-93E8-160448B4C8A0}"/>
+                <a16:creationId xmlns:a16="http://schemas.microsoft.com/office/drawing/2014/main" id="{914EC554-6BD0-D046-93E8-160448B4C8A0}"/>
               </a:ext>
             </a:extLst>
           </p:cNvPr>
@@ -3124,38 +3113,37 @@
           <a:p>
             <a:pPr lvl="0"/>
             <a:r>
-              <a:rPr lang="en-US" smtClean="0"/>
+              <a:rPr lang="en-US"/>
               <a:t>Click to edit Master text styles</a:t>
             </a:r>
           </a:p>
           <a:p>
             <a:pPr lvl="1"/>
             <a:r>
-              <a:rPr lang="en-US" smtClean="0"/>
+              <a:rPr lang="en-US"/>
               <a:t>Second level</a:t>
             </a:r>
           </a:p>
           <a:p>
             <a:pPr lvl="2"/>
             <a:r>
-              <a:rPr lang="en-US" smtClean="0"/>
+              <a:rPr lang="en-US"/>
               <a:t>Third level</a:t>
             </a:r>
           </a:p>
           <a:p>
             <a:pPr lvl="3"/>
             <a:r>
-              <a:rPr lang="en-US" smtClean="0"/>
+              <a:rPr lang="en-US"/>
               <a:t>Fourth level</a:t>
             </a:r>
           </a:p>
           <a:p>
             <a:pPr lvl="4"/>
             <a:r>
-              <a:rPr lang="en-US" smtClean="0"/>
+              <a:rPr lang="en-US"/>
               <a:t>Fifth level</a:t>
             </a:r>
-            <a:endParaRPr lang="en-US"/>
           </a:p>
         </p:txBody>
       </p:sp>
@@ -3164,7 +3152,7 @@
           <p:cNvPr id="4" name="Text Placeholder 3">
             <a:extLst>
               <a:ext uri="{FF2B5EF4-FFF2-40B4-BE49-F238E27FC236}">
-                <a16:creationId xmlns:a16="http://schemas.microsoft.com/office/drawing/2014/main" xmlns="" id="{1764FC1F-CB88-E848-A9AD-207062F13ACE}"/>
+                <a16:creationId xmlns:a16="http://schemas.microsoft.com/office/drawing/2014/main" id="{1764FC1F-CB88-E848-A9AD-207062F13ACE}"/>
               </a:ext>
             </a:extLst>
           </p:cNvPr>
@@ -3224,7 +3212,7 @@
           <a:p>
             <a:pPr lvl="0"/>
             <a:r>
-              <a:rPr lang="en-US" smtClean="0"/>
+              <a:rPr lang="en-US"/>
               <a:t>Click to edit Master text styles</a:t>
             </a:r>
           </a:p>
@@ -3235,7 +3223,7 @@
           <p:cNvPr id="5" name="Date Placeholder 4">
             <a:extLst>
               <a:ext uri="{FF2B5EF4-FFF2-40B4-BE49-F238E27FC236}">
-                <a16:creationId xmlns:a16="http://schemas.microsoft.com/office/drawing/2014/main" xmlns="" id="{A44DCBEE-639A-F74C-92CE-7B643E698FEB}"/>
+                <a16:creationId xmlns:a16="http://schemas.microsoft.com/office/drawing/2014/main" id="{A44DCBEE-639A-F74C-92CE-7B643E698FEB}"/>
               </a:ext>
             </a:extLst>
           </p:cNvPr>
@@ -3261,7 +3249,7 @@
           <a:p>
             <a:fld id="{08C20FDB-303D-8A4E-83B7-226DD88B97BD}" type="datetime1">
               <a:rPr lang="en-CA" smtClean="0"/>
-              <a:t>2020-06-07</a:t>
+              <a:t>2020-06-08</a:t>
             </a:fld>
             <a:endParaRPr lang="en-US"/>
           </a:p>
@@ -3272,7 +3260,7 @@
           <p:cNvPr id="6" name="Footer Placeholder 5">
             <a:extLst>
               <a:ext uri="{FF2B5EF4-FFF2-40B4-BE49-F238E27FC236}">
-                <a16:creationId xmlns:a16="http://schemas.microsoft.com/office/drawing/2014/main" xmlns="" id="{D01478D4-36A8-D941-B07C-23AC977B564E}"/>
+                <a16:creationId xmlns:a16="http://schemas.microsoft.com/office/drawing/2014/main" id="{D01478D4-36A8-D941-B07C-23AC977B564E}"/>
               </a:ext>
             </a:extLst>
           </p:cNvPr>
@@ -3308,7 +3296,7 @@
           <p:cNvPr id="7" name="Slide Number Placeholder 6">
             <a:extLst>
               <a:ext uri="{FF2B5EF4-FFF2-40B4-BE49-F238E27FC236}">
-                <a16:creationId xmlns:a16="http://schemas.microsoft.com/office/drawing/2014/main" xmlns="" id="{15E275A4-A22A-5742-B711-4A30FC409516}"/>
+                <a16:creationId xmlns:a16="http://schemas.microsoft.com/office/drawing/2014/main" id="{15E275A4-A22A-5742-B711-4A30FC409516}"/>
               </a:ext>
             </a:extLst>
           </p:cNvPr>
@@ -3345,7 +3333,7 @@
           <p:cNvPr id="8" name="Picture 7">
             <a:extLst>
               <a:ext uri="{FF2B5EF4-FFF2-40B4-BE49-F238E27FC236}">
-                <a16:creationId xmlns:a16="http://schemas.microsoft.com/office/drawing/2014/main" xmlns="" id="{99A484C7-B69E-1D4E-A042-8264DECEACD8}"/>
+                <a16:creationId xmlns:a16="http://schemas.microsoft.com/office/drawing/2014/main" id="{99A484C7-B69E-1D4E-A042-8264DECEACD8}"/>
               </a:ext>
             </a:extLst>
           </p:cNvPr>
@@ -3405,7 +3393,7 @@
           <p:cNvPr id="2" name="Title 1">
             <a:extLst>
               <a:ext uri="{FF2B5EF4-FFF2-40B4-BE49-F238E27FC236}">
-                <a16:creationId xmlns:a16="http://schemas.microsoft.com/office/drawing/2014/main" xmlns="" id="{90DC08D0-7399-754A-98B1-12196A1EC694}"/>
+                <a16:creationId xmlns:a16="http://schemas.microsoft.com/office/drawing/2014/main" id="{90DC08D0-7399-754A-98B1-12196A1EC694}"/>
               </a:ext>
             </a:extLst>
           </p:cNvPr>
@@ -3434,7 +3422,7 @@
           </a:lstStyle>
           <a:p>
             <a:r>
-              <a:rPr lang="en-US" smtClean="0"/>
+              <a:rPr lang="en-US"/>
               <a:t>Click to edit Master title style</a:t>
             </a:r>
             <a:endParaRPr lang="en-US" dirty="0"/>
@@ -3446,7 +3434,7 @@
           <p:cNvPr id="3" name="Picture Placeholder 2">
             <a:extLst>
               <a:ext uri="{FF2B5EF4-FFF2-40B4-BE49-F238E27FC236}">
-                <a16:creationId xmlns:a16="http://schemas.microsoft.com/office/drawing/2014/main" xmlns="" id="{AA8B8A4F-D838-F44B-BD4B-90A268DE740E}"/>
+                <a16:creationId xmlns:a16="http://schemas.microsoft.com/office/drawing/2014/main" id="{AA8B8A4F-D838-F44B-BD4B-90A268DE740E}"/>
               </a:ext>
             </a:extLst>
           </p:cNvPr>
@@ -3505,10 +3493,9 @@
           </a:lstStyle>
           <a:p>
             <a:r>
-              <a:rPr lang="en-US" smtClean="0"/>
+              <a:rPr lang="en-US"/>
               <a:t>Click icon to add picture</a:t>
             </a:r>
-            <a:endParaRPr lang="en-US"/>
           </a:p>
         </p:txBody>
       </p:sp>
@@ -3517,7 +3504,7 @@
           <p:cNvPr id="4" name="Text Placeholder 3">
             <a:extLst>
               <a:ext uri="{FF2B5EF4-FFF2-40B4-BE49-F238E27FC236}">
-                <a16:creationId xmlns:a16="http://schemas.microsoft.com/office/drawing/2014/main" xmlns="" id="{C2DFA813-173D-3F4D-9B47-2ADE7EDAAB7E}"/>
+                <a16:creationId xmlns:a16="http://schemas.microsoft.com/office/drawing/2014/main" id="{C2DFA813-173D-3F4D-9B47-2ADE7EDAAB7E}"/>
               </a:ext>
             </a:extLst>
           </p:cNvPr>
@@ -3577,7 +3564,7 @@
           <a:p>
             <a:pPr lvl="0"/>
             <a:r>
-              <a:rPr lang="en-US" smtClean="0"/>
+              <a:rPr lang="en-US"/>
               <a:t>Click to edit Master text styles</a:t>
             </a:r>
           </a:p>
@@ -3588,7 +3575,7 @@
           <p:cNvPr id="5" name="Date Placeholder 4">
             <a:extLst>
               <a:ext uri="{FF2B5EF4-FFF2-40B4-BE49-F238E27FC236}">
-                <a16:creationId xmlns:a16="http://schemas.microsoft.com/office/drawing/2014/main" xmlns="" id="{192A9922-D3F8-854D-946A-BACD40890EFE}"/>
+                <a16:creationId xmlns:a16="http://schemas.microsoft.com/office/drawing/2014/main" id="{192A9922-D3F8-854D-946A-BACD40890EFE}"/>
               </a:ext>
             </a:extLst>
           </p:cNvPr>
@@ -3614,7 +3601,7 @@
           <a:p>
             <a:fld id="{0A9EBA37-9D18-D34A-A88D-1B00AA06E95C}" type="datetime1">
               <a:rPr lang="en-CA" smtClean="0"/>
-              <a:t>2020-06-07</a:t>
+              <a:t>2020-06-08</a:t>
             </a:fld>
             <a:endParaRPr lang="en-US"/>
           </a:p>
@@ -3625,7 +3612,7 @@
           <p:cNvPr id="6" name="Footer Placeholder 5">
             <a:extLst>
               <a:ext uri="{FF2B5EF4-FFF2-40B4-BE49-F238E27FC236}">
-                <a16:creationId xmlns:a16="http://schemas.microsoft.com/office/drawing/2014/main" xmlns="" id="{0A8A5379-2EF0-014F-A404-9281AD5F5A90}"/>
+                <a16:creationId xmlns:a16="http://schemas.microsoft.com/office/drawing/2014/main" id="{0A8A5379-2EF0-014F-A404-9281AD5F5A90}"/>
               </a:ext>
             </a:extLst>
           </p:cNvPr>
@@ -3661,7 +3648,7 @@
           <p:cNvPr id="7" name="Slide Number Placeholder 6">
             <a:extLst>
               <a:ext uri="{FF2B5EF4-FFF2-40B4-BE49-F238E27FC236}">
-                <a16:creationId xmlns:a16="http://schemas.microsoft.com/office/drawing/2014/main" xmlns="" id="{1B5E44CB-9FEF-8E46-ADE7-C6878CCA2F9B}"/>
+                <a16:creationId xmlns:a16="http://schemas.microsoft.com/office/drawing/2014/main" id="{1B5E44CB-9FEF-8E46-ADE7-C6878CCA2F9B}"/>
               </a:ext>
             </a:extLst>
           </p:cNvPr>
@@ -3698,7 +3685,7 @@
           <p:cNvPr id="8" name="Picture 7">
             <a:extLst>
               <a:ext uri="{FF2B5EF4-FFF2-40B4-BE49-F238E27FC236}">
-                <a16:creationId xmlns:a16="http://schemas.microsoft.com/office/drawing/2014/main" xmlns="" id="{DA4E5D11-1589-8B43-AC25-08B65AFD2DD9}"/>
+                <a16:creationId xmlns:a16="http://schemas.microsoft.com/office/drawing/2014/main" id="{DA4E5D11-1589-8B43-AC25-08B65AFD2DD9}"/>
               </a:ext>
             </a:extLst>
           </p:cNvPr>
@@ -3763,7 +3750,7 @@
           <p:cNvPr id="3" name="Text Placeholder 2">
             <a:extLst>
               <a:ext uri="{FF2B5EF4-FFF2-40B4-BE49-F238E27FC236}">
-                <a16:creationId xmlns:a16="http://schemas.microsoft.com/office/drawing/2014/main" xmlns="" id="{CE3F3363-D36B-4942-87A8-FED6DF69AEAE}"/>
+                <a16:creationId xmlns:a16="http://schemas.microsoft.com/office/drawing/2014/main" id="{CE3F3363-D36B-4942-87A8-FED6DF69AEAE}"/>
               </a:ext>
             </a:extLst>
           </p:cNvPr>
@@ -3791,38 +3778,37 @@
           <a:p>
             <a:pPr lvl="0"/>
             <a:r>
-              <a:rPr lang="en-US" smtClean="0"/>
+              <a:rPr lang="en-US"/>
               <a:t>Click to edit Master text styles</a:t>
             </a:r>
           </a:p>
           <a:p>
             <a:pPr lvl="1"/>
             <a:r>
-              <a:rPr lang="en-US" smtClean="0"/>
+              <a:rPr lang="en-US"/>
               <a:t>Second level</a:t>
             </a:r>
           </a:p>
           <a:p>
             <a:pPr lvl="2"/>
             <a:r>
-              <a:rPr lang="en-US" smtClean="0"/>
+              <a:rPr lang="en-US"/>
               <a:t>Third level</a:t>
             </a:r>
           </a:p>
           <a:p>
             <a:pPr lvl="3"/>
             <a:r>
-              <a:rPr lang="en-US" smtClean="0"/>
+              <a:rPr lang="en-US"/>
               <a:t>Fourth level</a:t>
             </a:r>
           </a:p>
           <a:p>
             <a:pPr lvl="4"/>
             <a:r>
-              <a:rPr lang="en-US" smtClean="0"/>
+              <a:rPr lang="en-US"/>
               <a:t>Fifth level</a:t>
             </a:r>
-            <a:endParaRPr lang="en-US"/>
           </a:p>
         </p:txBody>
       </p:sp>
@@ -3831,7 +3817,7 @@
           <p:cNvPr id="8" name="Title Placeholder 7">
             <a:extLst>
               <a:ext uri="{FF2B5EF4-FFF2-40B4-BE49-F238E27FC236}">
-                <a16:creationId xmlns:a16="http://schemas.microsoft.com/office/drawing/2014/main" xmlns="" id="{5CA93B93-3243-C248-A970-24A76A358583}"/>
+                <a16:creationId xmlns:a16="http://schemas.microsoft.com/office/drawing/2014/main" id="{5CA93B93-3243-C248-A970-24A76A358583}"/>
               </a:ext>
             </a:extLst>
           </p:cNvPr>
@@ -3858,7 +3844,7 @@
           <a:lstStyle/>
           <a:p>
             <a:r>
-              <a:rPr lang="en-US" smtClean="0"/>
+              <a:rPr lang="en-US"/>
               <a:t>Click to edit Master title style</a:t>
             </a:r>
             <a:endParaRPr lang="en-US" dirty="0"/>
@@ -3870,7 +3856,7 @@
           <p:cNvPr id="9" name="Footer Placeholder 8">
             <a:extLst>
               <a:ext uri="{FF2B5EF4-FFF2-40B4-BE49-F238E27FC236}">
-                <a16:creationId xmlns:a16="http://schemas.microsoft.com/office/drawing/2014/main" xmlns="" id="{BE28B5F4-1EA0-4A4B-8D85-A0B1CB6C7EBC}"/>
+                <a16:creationId xmlns:a16="http://schemas.microsoft.com/office/drawing/2014/main" id="{BE28B5F4-1EA0-4A4B-8D85-A0B1CB6C7EBC}"/>
               </a:ext>
             </a:extLst>
           </p:cNvPr>
@@ -3917,7 +3903,7 @@
           <p:cNvPr id="10" name="Date Placeholder 3">
             <a:extLst>
               <a:ext uri="{FF2B5EF4-FFF2-40B4-BE49-F238E27FC236}">
-                <a16:creationId xmlns:a16="http://schemas.microsoft.com/office/drawing/2014/main" xmlns="" id="{88BACC8E-7FE2-EE49-8CEA-AAD5143CE50E}"/>
+                <a16:creationId xmlns:a16="http://schemas.microsoft.com/office/drawing/2014/main" id="{88BACC8E-7FE2-EE49-8CEA-AAD5143CE50E}"/>
               </a:ext>
             </a:extLst>
           </p:cNvPr>
@@ -3955,7 +3941,7 @@
             <a:fld id="{B73A2E78-F38A-E046-ACDB-668F070D1EF6}" type="datetime1">
               <a:rPr lang="en-CA" smtClean="0"/>
               <a:pPr/>
-              <a:t>2020-06-07</a:t>
+              <a:t>2020-06-08</a:t>
             </a:fld>
             <a:endParaRPr lang="en-US" dirty="0"/>
           </a:p>
@@ -3966,7 +3952,7 @@
           <p:cNvPr id="11" name="Slide Number Placeholder 5">
             <a:extLst>
               <a:ext uri="{FF2B5EF4-FFF2-40B4-BE49-F238E27FC236}">
-                <a16:creationId xmlns:a16="http://schemas.microsoft.com/office/drawing/2014/main" xmlns="" id="{8D3E7A09-626A-BA49-9FC3-7280AA1F93DE}"/>
+                <a16:creationId xmlns:a16="http://schemas.microsoft.com/office/drawing/2014/main" id="{8D3E7A09-626A-BA49-9FC3-7280AA1F93DE}"/>
               </a:ext>
             </a:extLst>
           </p:cNvPr>
@@ -4337,7 +4323,7 @@
           <p:cNvPr id="2" name="Title 1">
             <a:extLst>
               <a:ext uri="{FF2B5EF4-FFF2-40B4-BE49-F238E27FC236}">
-                <a16:creationId xmlns:a16="http://schemas.microsoft.com/office/drawing/2014/main" xmlns="" id="{F0887674-345B-6D45-8433-396169D87CDD}"/>
+                <a16:creationId xmlns:a16="http://schemas.microsoft.com/office/drawing/2014/main" id="{F0887674-345B-6D45-8433-396169D87CDD}"/>
               </a:ext>
             </a:extLst>
           </p:cNvPr>
@@ -4354,10 +4340,9 @@
           <a:lstStyle/>
           <a:p>
             <a:r>
-              <a:rPr lang="en-US" dirty="0" smtClean="0"/>
+              <a:rPr lang="en-US" dirty="0"/>
               <a:t>Discovery</a:t>
             </a:r>
-            <a:endParaRPr lang="en-US" dirty="0"/>
           </a:p>
         </p:txBody>
       </p:sp>
@@ -4366,7 +4351,7 @@
           <p:cNvPr id="3" name="Subtitle 2">
             <a:extLst>
               <a:ext uri="{FF2B5EF4-FFF2-40B4-BE49-F238E27FC236}">
-                <a16:creationId xmlns:a16="http://schemas.microsoft.com/office/drawing/2014/main" xmlns="" id="{C0E957DB-7468-C943-8F4B-9FE90A3CB8D2}"/>
+                <a16:creationId xmlns:a16="http://schemas.microsoft.com/office/drawing/2014/main" id="{C0E957DB-7468-C943-8F4B-9FE90A3CB8D2}"/>
               </a:ext>
             </a:extLst>
           </p:cNvPr>
@@ -4383,25 +4368,23 @@
           <a:lstStyle/>
           <a:p>
             <a:r>
-              <a:rPr lang="en-US" dirty="0" smtClean="0"/>
+              <a:rPr lang="en-US" dirty="0"/>
               <a:t>Michael </a:t>
             </a:r>
             <a:r>
-              <a:rPr lang="en-US" dirty="0" err="1" smtClean="0"/>
+              <a:rPr lang="en-US" dirty="0" err="1"/>
               <a:t>McCool,</a:t>
             </a:r>
             <a:r>
-              <a:rPr lang="en-US" dirty="0" smtClean="0"/>
+              <a:rPr lang="en-US" dirty="0"/>
               <a:t> Intel</a:t>
             </a:r>
-            <a:endParaRPr lang="en-US" dirty="0"/>
-          </a:p>
-          <a:p>
-            <a:r>
-              <a:rPr lang="en-US" dirty="0" smtClean="0"/>
+          </a:p>
+          <a:p>
+            <a:r>
+              <a:rPr lang="en-US" dirty="0"/>
               <a:t>8 June 2020</a:t>
             </a:r>
-            <a:endParaRPr lang="en-US" dirty="0"/>
           </a:p>
         </p:txBody>
       </p:sp>
@@ -4410,7 +4393,7 @@
           <p:cNvPr id="4" name="Footer Placeholder 3">
             <a:extLst>
               <a:ext uri="{FF2B5EF4-FFF2-40B4-BE49-F238E27FC236}">
-                <a16:creationId xmlns:a16="http://schemas.microsoft.com/office/drawing/2014/main" xmlns="" id="{708488F1-92D7-254A-A373-03160DC753D3}"/>
+                <a16:creationId xmlns:a16="http://schemas.microsoft.com/office/drawing/2014/main" id="{708488F1-92D7-254A-A373-03160DC753D3}"/>
               </a:ext>
             </a:extLst>
           </p:cNvPr>
@@ -4468,7 +4451,7 @@
           <p:cNvPr id="2" name="Title 1">
             <a:extLst>
               <a:ext uri="{FF2B5EF4-FFF2-40B4-BE49-F238E27FC236}">
-                <a16:creationId xmlns:a16="http://schemas.microsoft.com/office/drawing/2014/main" xmlns="" id="{1D092AD7-6764-453A-9434-7D5147ECC34E}"/>
+                <a16:creationId xmlns:a16="http://schemas.microsoft.com/office/drawing/2014/main" id="{1D092AD7-6764-453A-9434-7D5147ECC34E}"/>
               </a:ext>
             </a:extLst>
           </p:cNvPr>
@@ -4496,7 +4479,7 @@
           <p:cNvPr id="3" name="Content Placeholder 2">
             <a:extLst>
               <a:ext uri="{FF2B5EF4-FFF2-40B4-BE49-F238E27FC236}">
-                <a16:creationId xmlns:a16="http://schemas.microsoft.com/office/drawing/2014/main" xmlns="" id="{0E579435-624A-46CA-9339-B32D0850200E}"/>
+                <a16:creationId xmlns:a16="http://schemas.microsoft.com/office/drawing/2014/main" id="{0E579435-624A-46CA-9339-B32D0850200E}"/>
               </a:ext>
             </a:extLst>
           </p:cNvPr>
@@ -4670,7 +4653,7 @@
           <p:cNvPr id="4" name="Slide Number Placeholder 3">
             <a:extLst>
               <a:ext uri="{FF2B5EF4-FFF2-40B4-BE49-F238E27FC236}">
-                <a16:creationId xmlns:a16="http://schemas.microsoft.com/office/drawing/2014/main" xmlns="" id="{CF7CADE4-4BD5-480E-9FAD-FC2A1E703EBA}"/>
+                <a16:creationId xmlns:a16="http://schemas.microsoft.com/office/drawing/2014/main" id="{CF7CADE4-4BD5-480E-9FAD-FC2A1E703EBA}"/>
               </a:ext>
             </a:extLst>
           </p:cNvPr>
@@ -4729,7 +4712,7 @@
           <p:cNvPr id="2" name="Title 1">
             <a:extLst>
               <a:ext uri="{FF2B5EF4-FFF2-40B4-BE49-F238E27FC236}">
-                <a16:creationId xmlns:a16="http://schemas.microsoft.com/office/drawing/2014/main" xmlns="" id="{13A2E9E9-89D7-4C6F-998D-BC3DD9950107}"/>
+                <a16:creationId xmlns:a16="http://schemas.microsoft.com/office/drawing/2014/main" id="{13A2E9E9-89D7-4C6F-998D-BC3DD9950107}"/>
               </a:ext>
             </a:extLst>
           </p:cNvPr>
@@ -4746,10 +4729,9 @@
           <a:lstStyle/>
           <a:p>
             <a:r>
-              <a:rPr lang="en-US" dirty="0" smtClean="0"/>
+              <a:rPr lang="en-US" dirty="0"/>
               <a:t>Two-Phase Architecture</a:t>
             </a:r>
-            <a:endParaRPr lang="en-US" dirty="0"/>
           </a:p>
         </p:txBody>
       </p:sp>
@@ -4758,7 +4740,7 @@
           <p:cNvPr id="3" name="Content Placeholder 2">
             <a:extLst>
               <a:ext uri="{FF2B5EF4-FFF2-40B4-BE49-F238E27FC236}">
-                <a16:creationId xmlns:a16="http://schemas.microsoft.com/office/drawing/2014/main" xmlns="" id="{C2E06493-B506-46BF-9F19-0C6E79F00659}"/>
+                <a16:creationId xmlns:a16="http://schemas.microsoft.com/office/drawing/2014/main" id="{C2E06493-B506-46BF-9F19-0C6E79F00659}"/>
               </a:ext>
             </a:extLst>
           </p:cNvPr>
@@ -4836,15 +4818,7 @@
             <a:pPr lvl="2"/>
             <a:r>
               <a:rPr lang="en-US" dirty="0"/>
-              <a:t>R</a:t>
-            </a:r>
-            <a:r>
-              <a:rPr lang="en-US" dirty="0" smtClean="0"/>
-              <a:t>esistant </a:t>
-            </a:r>
-            <a:r>
-              <a:rPr lang="en-US" dirty="0"/>
-              <a:t>to Denial of Service attacks</a:t>
+              <a:t>Resistant to Denial of Service attacks</a:t>
             </a:r>
           </a:p>
           <a:p>
@@ -4896,15 +4870,7 @@
             <a:pPr lvl="1"/>
             <a:r>
               <a:rPr lang="en-US" dirty="0"/>
-              <a:t>Provides </a:t>
-            </a:r>
-            <a:r>
-              <a:rPr lang="en-US" dirty="0" smtClean="0"/>
-              <a:t>access to rich </a:t>
-            </a:r>
-            <a:r>
-              <a:rPr lang="en-US" dirty="0"/>
-              <a:t>metadata</a:t>
+              <a:t>Provides access to rich metadata</a:t>
             </a:r>
           </a:p>
           <a:p>
@@ -4921,7 +4887,7 @@
           <p:cNvPr id="4" name="Slide Number Placeholder 3">
             <a:extLst>
               <a:ext uri="{FF2B5EF4-FFF2-40B4-BE49-F238E27FC236}">
-                <a16:creationId xmlns:a16="http://schemas.microsoft.com/office/drawing/2014/main" xmlns="" id="{37ED7C0D-F508-4DF8-825D-60BFF6326C8D}"/>
+                <a16:creationId xmlns:a16="http://schemas.microsoft.com/office/drawing/2014/main" id="{37ED7C0D-F508-4DF8-825D-60BFF6326C8D}"/>
               </a:ext>
             </a:extLst>
           </p:cNvPr>
@@ -4980,7 +4946,7 @@
           <p:cNvPr id="2" name="Title 1">
             <a:extLst>
               <a:ext uri="{FF2B5EF4-FFF2-40B4-BE49-F238E27FC236}">
-                <a16:creationId xmlns:a16="http://schemas.microsoft.com/office/drawing/2014/main" xmlns="" id="{13A2E9E9-89D7-4C6F-998D-BC3DD9950107}"/>
+                <a16:creationId xmlns:a16="http://schemas.microsoft.com/office/drawing/2014/main" id="{13A2E9E9-89D7-4C6F-998D-BC3DD9950107}"/>
               </a:ext>
             </a:extLst>
           </p:cNvPr>
@@ -5008,7 +4974,7 @@
           <p:cNvPr id="3" name="Content Placeholder 2">
             <a:extLst>
               <a:ext uri="{FF2B5EF4-FFF2-40B4-BE49-F238E27FC236}">
-                <a16:creationId xmlns:a16="http://schemas.microsoft.com/office/drawing/2014/main" xmlns="" id="{C2E06493-B506-46BF-9F19-0C6E79F00659}"/>
+                <a16:creationId xmlns:a16="http://schemas.microsoft.com/office/drawing/2014/main" id="{C2E06493-B506-46BF-9F19-0C6E79F00659}"/>
               </a:ext>
             </a:extLst>
           </p:cNvPr>
@@ -5040,13 +5006,8 @@
             <a:pPr lvl="1"/>
             <a:r>
               <a:rPr lang="en-US" dirty="0"/>
-              <a:t>Output: Address of </a:t>
-            </a:r>
-            <a:r>
-              <a:rPr lang="en-US" dirty="0" smtClean="0"/>
-              <a:t>exploration service, for example, a directory service</a:t>
-            </a:r>
-            <a:endParaRPr lang="en-US" dirty="0"/>
+              <a:t>Output: Address of exploration service, for example, a directory service</a:t>
+            </a:r>
           </a:p>
           <a:p>
             <a:pPr lvl="1"/>
@@ -5074,15 +5035,7 @@
           <a:p>
             <a:r>
               <a:rPr lang="en-US" dirty="0"/>
-              <a:t>Address should not leak any other metadata, </a:t>
-            </a:r>
-            <a:r>
-              <a:rPr lang="en-US" dirty="0" smtClean="0"/>
-              <a:t>e.g. </a:t>
-            </a:r>
-            <a:r>
-              <a:rPr lang="en-US" dirty="0"/>
-              <a:t>type of devices</a:t>
+              <a:t>Address should not leak any other metadata, e.g. type of devices</a:t>
             </a:r>
           </a:p>
           <a:p>
@@ -5191,7 +5144,7 @@
           <p:cNvPr id="4" name="Slide Number Placeholder 3">
             <a:extLst>
               <a:ext uri="{FF2B5EF4-FFF2-40B4-BE49-F238E27FC236}">
-                <a16:creationId xmlns:a16="http://schemas.microsoft.com/office/drawing/2014/main" xmlns="" id="{37ED7C0D-F508-4DF8-825D-60BFF6326C8D}"/>
+                <a16:creationId xmlns:a16="http://schemas.microsoft.com/office/drawing/2014/main" id="{37ED7C0D-F508-4DF8-825D-60BFF6326C8D}"/>
               </a:ext>
             </a:extLst>
           </p:cNvPr>
@@ -5250,7 +5203,7 @@
           <p:cNvPr id="2" name="Title 1">
             <a:extLst>
               <a:ext uri="{FF2B5EF4-FFF2-40B4-BE49-F238E27FC236}">
-                <a16:creationId xmlns:a16="http://schemas.microsoft.com/office/drawing/2014/main" xmlns="" id="{13A2E9E9-89D7-4C6F-998D-BC3DD9950107}"/>
+                <a16:creationId xmlns:a16="http://schemas.microsoft.com/office/drawing/2014/main" id="{13A2E9E9-89D7-4C6F-998D-BC3DD9950107}"/>
               </a:ext>
             </a:extLst>
           </p:cNvPr>
@@ -5278,7 +5231,7 @@
           <p:cNvPr id="3" name="Content Placeholder 2">
             <a:extLst>
               <a:ext uri="{FF2B5EF4-FFF2-40B4-BE49-F238E27FC236}">
-                <a16:creationId xmlns:a16="http://schemas.microsoft.com/office/drawing/2014/main" xmlns="" id="{C2E06493-B506-46BF-9F19-0C6E79F00659}"/>
+                <a16:creationId xmlns:a16="http://schemas.microsoft.com/office/drawing/2014/main" id="{C2E06493-B506-46BF-9F19-0C6E79F00659}"/>
               </a:ext>
             </a:extLst>
           </p:cNvPr>
@@ -5381,7 +5334,7 @@
           <p:cNvPr id="4" name="Slide Number Placeholder 3">
             <a:extLst>
               <a:ext uri="{FF2B5EF4-FFF2-40B4-BE49-F238E27FC236}">
-                <a16:creationId xmlns:a16="http://schemas.microsoft.com/office/drawing/2014/main" xmlns="" id="{37ED7C0D-F508-4DF8-825D-60BFF6326C8D}"/>
+                <a16:creationId xmlns:a16="http://schemas.microsoft.com/office/drawing/2014/main" id="{37ED7C0D-F508-4DF8-825D-60BFF6326C8D}"/>
               </a:ext>
             </a:extLst>
           </p:cNvPr>
@@ -5440,7 +5393,7 @@
           <p:cNvPr id="2" name="Title 1">
             <a:extLst>
               <a:ext uri="{FF2B5EF4-FFF2-40B4-BE49-F238E27FC236}">
-                <a16:creationId xmlns:a16="http://schemas.microsoft.com/office/drawing/2014/main" xmlns="" id="{34DDB75B-CFAF-1044-9233-8309FBED14DC}"/>
+                <a16:creationId xmlns:a16="http://schemas.microsoft.com/office/drawing/2014/main" id="{34DDB75B-CFAF-1044-9233-8309FBED14DC}"/>
               </a:ext>
             </a:extLst>
           </p:cNvPr>
@@ -5468,7 +5421,7 @@
           <p:cNvPr id="3" name="Content Placeholder 2">
             <a:extLst>
               <a:ext uri="{FF2B5EF4-FFF2-40B4-BE49-F238E27FC236}">
-                <a16:creationId xmlns:a16="http://schemas.microsoft.com/office/drawing/2014/main" xmlns="" id="{C16349BE-57FD-E94B-A65B-71E3594D8297}"/>
+                <a16:creationId xmlns:a16="http://schemas.microsoft.com/office/drawing/2014/main" id="{C16349BE-57FD-E94B-A65B-71E3594D8297}"/>
               </a:ext>
             </a:extLst>
           </p:cNvPr>
@@ -5579,7 +5532,7 @@
           <p:cNvPr id="4" name="Slide Number Placeholder 3">
             <a:extLst>
               <a:ext uri="{FF2B5EF4-FFF2-40B4-BE49-F238E27FC236}">
-                <a16:creationId xmlns:a16="http://schemas.microsoft.com/office/drawing/2014/main" xmlns="" id="{21EF4E36-3B13-FB47-AEF6-BE61BD0E1E85}"/>
+                <a16:creationId xmlns:a16="http://schemas.microsoft.com/office/drawing/2014/main" id="{21EF4E36-3B13-FB47-AEF6-BE61BD0E1E85}"/>
               </a:ext>
             </a:extLst>
           </p:cNvPr>
@@ -5638,7 +5591,7 @@
           <p:cNvPr id="2" name="Title 1">
             <a:extLst>
               <a:ext uri="{FF2B5EF4-FFF2-40B4-BE49-F238E27FC236}">
-                <a16:creationId xmlns:a16="http://schemas.microsoft.com/office/drawing/2014/main" xmlns="" id="{FD85487D-51EB-304A-A005-5FEE4A38C031}"/>
+                <a16:creationId xmlns:a16="http://schemas.microsoft.com/office/drawing/2014/main" id="{65B2AF1E-805D-0C42-AA0B-D8F84F417A9F}"/>
               </a:ext>
             </a:extLst>
           </p:cNvPr>
@@ -5656,11 +5609,111 @@
           <a:p>
             <a:r>
               <a:rPr lang="en-US" dirty="0"/>
-              <a:t>Current Scripting API – </a:t>
-            </a:r>
-            <a:r>
-              <a:rPr lang="en-US"/>
-              <a:t>Discussion Points</a:t>
+              <a:t>Resources</a:t>
+            </a:r>
+          </a:p>
+        </p:txBody>
+      </p:sp>
+      <p:sp>
+        <p:nvSpPr>
+          <p:cNvPr id="3" name="Content Placeholder 2">
+            <a:extLst>
+              <a:ext uri="{FF2B5EF4-FFF2-40B4-BE49-F238E27FC236}">
+                <a16:creationId xmlns:a16="http://schemas.microsoft.com/office/drawing/2014/main" id="{EA889852-CEA2-9840-8A33-D03402EA877B}"/>
+              </a:ext>
+            </a:extLst>
+          </p:cNvPr>
+          <p:cNvSpPr>
+            <a:spLocks noGrp="1"/>
+          </p:cNvSpPr>
+          <p:nvPr>
+            <p:ph idx="1"/>
+          </p:nvPr>
+        </p:nvSpPr>
+        <p:spPr>
+          <a:xfrm>
+            <a:off x="838200" y="1188720"/>
+            <a:ext cx="10515600" cy="4988243"/>
+          </a:xfrm>
+        </p:spPr>
+        <p:txBody>
+          <a:bodyPr/>
+          <a:lstStyle/>
+          <a:p>
+            <a:r>
+              <a:rPr lang="en-US" dirty="0"/>
+              <a:t>Repository: </a:t>
+            </a:r>
+            <a:r>
+              <a:rPr lang="en-CA" dirty="0">
+                <a:hlinkClick r:id="rId2"/>
+              </a:rPr>
+              <a:t>https://github.com/w3c/wot-discovery</a:t>
+            </a:r>
+            <a:endParaRPr lang="en-CA" dirty="0"/>
+          </a:p>
+          <a:p>
+            <a:r>
+              <a:rPr lang="en-CA" dirty="0"/>
+              <a:t>Prior work: </a:t>
+            </a:r>
+            <a:r>
+              <a:rPr lang="en-CA" dirty="0">
+                <a:hlinkClick r:id="rId3"/>
+              </a:rPr>
+              <a:t>https://github.com/w3c/wot-discovery/blob/master/prior.md</a:t>
+            </a:r>
+            <a:endParaRPr lang="en-CA" dirty="0"/>
+          </a:p>
+          <a:p>
+            <a:r>
+              <a:rPr lang="en-CA" dirty="0"/>
+              <a:t>Background: </a:t>
+            </a:r>
+            <a:r>
+              <a:rPr lang="en-CA" dirty="0">
+                <a:hlinkClick r:id="rId4"/>
+              </a:rPr>
+              <a:t>https://github.com/w3c/wot-discovery/blob/master/background.md</a:t>
+            </a:r>
+            <a:endParaRPr lang="en-CA" dirty="0"/>
+          </a:p>
+          <a:p>
+            <a:r>
+              <a:rPr lang="en-US" dirty="0"/>
+              <a:t>Requirements: </a:t>
+            </a:r>
+            <a:r>
+              <a:rPr lang="en-CA" dirty="0">
+                <a:hlinkClick r:id="rId5"/>
+              </a:rPr>
+              <a:t>https://github.com/w3c/wot-discovery/blob/master/requirements.md</a:t>
+            </a:r>
+            <a:endParaRPr lang="en-CA" dirty="0"/>
+          </a:p>
+          <a:p>
+            <a:r>
+              <a:rPr lang="en-CA" dirty="0"/>
+              <a:t>Design: </a:t>
+            </a:r>
+            <a:r>
+              <a:rPr lang="en-CA" dirty="0">
+                <a:hlinkClick r:id="rId6"/>
+              </a:rPr>
+              <a:t>https://github.com/w3c/wot-discovery/blob/master/design.md</a:t>
+            </a:r>
+            <a:endParaRPr lang="en-CA" dirty="0"/>
+          </a:p>
+          <a:p>
+            <a:r>
+              <a:rPr lang="en-CA" dirty="0"/>
+              <a:t>Proposals: </a:t>
+            </a:r>
+            <a:r>
+              <a:rPr lang="en-CA" dirty="0">
+                <a:hlinkClick r:id="rId7"/>
+              </a:rPr>
+              <a:t>https://github.com/w3c/wot-discovery/tree/master/proposals</a:t>
             </a:r>
             <a:endParaRPr lang="en-US" dirty="0"/>
           </a:p>
@@ -5668,145 +5721,38 @@
       </p:sp>
       <p:sp>
         <p:nvSpPr>
-          <p:cNvPr id="3" name="Content Placeholder 2">
-            <a:extLst>
-              <a:ext uri="{FF2B5EF4-FFF2-40B4-BE49-F238E27FC236}">
-                <a16:creationId xmlns:a16="http://schemas.microsoft.com/office/drawing/2014/main" xmlns="" id="{31B79F32-6A96-7047-BE64-0D9F4F4B939C}"/>
-              </a:ext>
-            </a:extLst>
-          </p:cNvPr>
-          <p:cNvSpPr>
-            <a:spLocks noGrp="1"/>
-          </p:cNvSpPr>
-          <p:nvPr>
-            <p:ph idx="1"/>
-          </p:nvPr>
-        </p:nvSpPr>
-        <p:spPr>
-          <a:xfrm>
-            <a:off x="960783" y="1341856"/>
-            <a:ext cx="10621618" cy="5037935"/>
-          </a:xfrm>
-        </p:spPr>
-        <p:txBody>
-          <a:bodyPr>
-            <a:normAutofit fontScale="85000" lnSpcReduction="20000"/>
-          </a:bodyPr>
-          <a:lstStyle/>
-          <a:p>
-            <a:r>
-              <a:rPr lang="en-US" dirty="0"/>
-              <a:t>Allows discovery mechanism to be specified</a:t>
-            </a:r>
-          </a:p>
-          <a:p>
-            <a:r>
-              <a:rPr lang="en-US" dirty="0"/>
-              <a:t>Returns discovered TDs</a:t>
-            </a:r>
-          </a:p>
-          <a:p>
-            <a:r>
-              <a:rPr lang="en-US" dirty="0"/>
-              <a:t>Assumes authentication/authorization is handled out-of-band</a:t>
-            </a:r>
-          </a:p>
-          <a:p>
-            <a:pPr marL="0" indent="0">
-              <a:buNone/>
-            </a:pPr>
-            <a:r>
-              <a:rPr lang="en-US" dirty="0"/>
-              <a:t>Discussion Points:</a:t>
-            </a:r>
-          </a:p>
-          <a:p>
-            <a:r>
-              <a:rPr lang="en-US" dirty="0"/>
-              <a:t>Not incompatible with two-phase approach</a:t>
-            </a:r>
-          </a:p>
-          <a:p>
-            <a:pPr lvl="1"/>
-            <a:r>
-              <a:rPr lang="en-US" dirty="0"/>
-              <a:t>Authentication/authorization needs to be set up outside script</a:t>
-            </a:r>
-          </a:p>
-          <a:p>
-            <a:r>
-              <a:rPr lang="en-US" dirty="0"/>
-              <a:t>Query format needs to be better standardized</a:t>
-            </a:r>
-          </a:p>
-          <a:p>
-            <a:pPr lvl="1"/>
-            <a:r>
-              <a:rPr lang="en-US" dirty="0"/>
-              <a:t>What query forms are supported?  What are the parameters?</a:t>
-            </a:r>
-          </a:p>
-          <a:p>
-            <a:pPr lvl="1"/>
-            <a:r>
-              <a:rPr lang="en-US" dirty="0"/>
-              <a:t>How can I search for Things in a particular physical location (that I am not necessarily at?)</a:t>
-            </a:r>
-          </a:p>
-          <a:p>
-            <a:r>
-              <a:rPr lang="en-US" dirty="0"/>
-              <a:t>Options to select mechanisms may be a privacy risk</a:t>
-            </a:r>
-          </a:p>
-          <a:p>
-            <a:pPr lvl="1"/>
-            <a:r>
-              <a:rPr lang="en-US" dirty="0"/>
-              <a:t>If I can discover a thing via Bluetooth, I know it is within a few meters</a:t>
-            </a:r>
-          </a:p>
-          <a:p>
-            <a:pPr lvl="1"/>
-            <a:r>
-              <a:rPr lang="en-US" dirty="0"/>
-              <a:t>Perhaps the mechanisms and desired location should also be specified out of band</a:t>
-            </a:r>
-          </a:p>
-          <a:p>
-            <a:r>
-              <a:rPr lang="en-US" dirty="0"/>
-              <a:t>Alternatives:</a:t>
-            </a:r>
-          </a:p>
-          <a:p>
-            <a:pPr lvl="1"/>
-            <a:r>
-              <a:rPr lang="en-US" dirty="0"/>
-              <a:t> “Discovery sub-API” could be factored out and run during setup, like security config</a:t>
-            </a:r>
-          </a:p>
-          <a:p>
-            <a:pPr lvl="1"/>
-            <a:r>
-              <a:rPr lang="en-US" dirty="0"/>
-              <a:t> Things to be consumed by a script perhaps managed declaratively using dependences</a:t>
-            </a:r>
-          </a:p>
-          <a:p>
-            <a:endParaRPr lang="en-US" dirty="0"/>
-          </a:p>
-          <a:p>
-            <a:endParaRPr lang="en-US" dirty="0"/>
-          </a:p>
-        </p:txBody>
-      </p:sp>
-      <p:sp>
-        <p:nvSpPr>
-          <p:cNvPr id="4" name="Slide Number Placeholder 3">
-            <a:extLst>
-              <a:ext uri="{FF2B5EF4-FFF2-40B4-BE49-F238E27FC236}">
-                <a16:creationId xmlns:a16="http://schemas.microsoft.com/office/drawing/2014/main" xmlns="" id="{56D5C4C6-084D-104C-AEC5-B2C14B2F60CE}"/>
+          <p:cNvPr id="4" name="Footer Placeholder 3">
+            <a:extLst>
+              <a:ext uri="{FF2B5EF4-FFF2-40B4-BE49-F238E27FC236}">
+                <a16:creationId xmlns:a16="http://schemas.microsoft.com/office/drawing/2014/main" id="{3912E658-CED1-684A-B1A2-3BB6B4C5CC4D}"/>
+              </a:ext>
+            </a:extLst>
+          </p:cNvPr>
+          <p:cNvSpPr>
+            <a:spLocks noGrp="1"/>
+          </p:cNvSpPr>
+          <p:nvPr>
+            <p:ph type="ftr" sz="quarter" idx="11"/>
+          </p:nvPr>
+        </p:nvSpPr>
+        <p:spPr/>
+        <p:txBody>
+          <a:bodyPr/>
+          <a:lstStyle/>
+          <a:p>
+            <a:r>
+              <a:rPr lang="en-US"/>
+              <a:t>W3C Web of Things (WoT) WG/IG</a:t>
+            </a:r>
+          </a:p>
+        </p:txBody>
+      </p:sp>
+      <p:sp>
+        <p:nvSpPr>
+          <p:cNvPr id="5" name="Slide Number Placeholder 4">
+            <a:extLst>
+              <a:ext uri="{FF2B5EF4-FFF2-40B4-BE49-F238E27FC236}">
+                <a16:creationId xmlns:a16="http://schemas.microsoft.com/office/drawing/2014/main" id="{6A3FFD64-E8D7-E042-8A86-EA17408D63FF}"/>
               </a:ext>
             </a:extLst>
           </p:cNvPr>
@@ -5822,7 +5768,7 @@
           <a:bodyPr/>
           <a:lstStyle/>
           <a:p>
-            <a:fld id="{30564719-00ED-40AD-AF49-5F6D6B9333CD}" type="slidenum">
+            <a:fld id="{055BDE2E-7167-1944-9FEE-E44668D91CB6}" type="slidenum">
               <a:rPr lang="en-US" smtClean="0"/>
               <a:t>7</a:t>
             </a:fld>
@@ -5830,10 +5776,515 @@
           </a:p>
         </p:txBody>
       </p:sp>
+      <p:sp>
+        <p:nvSpPr>
+          <p:cNvPr id="6" name="Date Placeholder 5">
+            <a:extLst>
+              <a:ext uri="{FF2B5EF4-FFF2-40B4-BE49-F238E27FC236}">
+                <a16:creationId xmlns:a16="http://schemas.microsoft.com/office/drawing/2014/main" id="{1B5FE99C-A356-3F41-B1DA-C5C52D194A46}"/>
+              </a:ext>
+            </a:extLst>
+          </p:cNvPr>
+          <p:cNvSpPr>
+            <a:spLocks noGrp="1"/>
+          </p:cNvSpPr>
+          <p:nvPr>
+            <p:ph type="dt" sz="half" idx="10"/>
+          </p:nvPr>
+        </p:nvSpPr>
+        <p:spPr/>
+        <p:txBody>
+          <a:bodyPr/>
+          <a:lstStyle/>
+          <a:p>
+            <a:fld id="{B929AB1E-7FD9-0A40-B7C0-508CCACB3E9A}" type="datetime1">
+              <a:rPr lang="en-CA" smtClean="0"/>
+              <a:t>2020-06-08</a:t>
+            </a:fld>
+            <a:endParaRPr lang="en-US"/>
+          </a:p>
+        </p:txBody>
+      </p:sp>
+    </p:spTree>
+    <p:extLst>
+      <p:ext uri="{BB962C8B-B14F-4D97-AF65-F5344CB8AC3E}">
+        <p14:creationId xmlns:p14="http://schemas.microsoft.com/office/powerpoint/2010/main" val="521508270"/>
+      </p:ext>
+    </p:extLst>
+  </p:cSld>
+  <p:clrMapOvr>
+    <a:masterClrMapping/>
+  </p:clrMapOvr>
+</p:sld>
+</file>
+
+<file path=ppt/slides/slide8.xml><?xml version="1.0" encoding="utf-8"?>
+<p:sld xmlns:a="http://schemas.openxmlformats.org/drawingml/2006/main" xmlns:r="http://schemas.openxmlformats.org/officeDocument/2006/relationships" xmlns:p="http://schemas.openxmlformats.org/presentationml/2006/main">
+  <p:cSld>
+    <p:spTree>
+      <p:nvGrpSpPr>
+        <p:cNvPr id="1" name=""/>
+        <p:cNvGrpSpPr/>
+        <p:nvPr/>
+      </p:nvGrpSpPr>
+      <p:grpSpPr>
+        <a:xfrm>
+          <a:off x="0" y="0"/>
+          <a:ext cx="0" cy="0"/>
+          <a:chOff x="0" y="0"/>
+          <a:chExt cx="0" cy="0"/>
+        </a:xfrm>
+      </p:grpSpPr>
+      <p:sp>
+        <p:nvSpPr>
+          <p:cNvPr id="2" name="Title 1">
+            <a:extLst>
+              <a:ext uri="{FF2B5EF4-FFF2-40B4-BE49-F238E27FC236}">
+                <a16:creationId xmlns:a16="http://schemas.microsoft.com/office/drawing/2014/main" id="{FD85487D-51EB-304A-A005-5FEE4A38C031}"/>
+              </a:ext>
+            </a:extLst>
+          </p:cNvPr>
+          <p:cNvSpPr>
+            <a:spLocks noGrp="1"/>
+          </p:cNvSpPr>
+          <p:nvPr>
+            <p:ph type="title"/>
+          </p:nvPr>
+        </p:nvSpPr>
+        <p:spPr/>
+        <p:txBody>
+          <a:bodyPr/>
+          <a:lstStyle/>
+          <a:p>
+            <a:r>
+              <a:rPr lang="en-US" dirty="0"/>
+              <a:t>Current Scripting API – </a:t>
+            </a:r>
+            <a:r>
+              <a:rPr lang="en-US"/>
+              <a:t>Discussion Points</a:t>
+            </a:r>
+            <a:endParaRPr lang="en-US" dirty="0"/>
+          </a:p>
+        </p:txBody>
+      </p:sp>
+      <p:sp>
+        <p:nvSpPr>
+          <p:cNvPr id="3" name="Content Placeholder 2">
+            <a:extLst>
+              <a:ext uri="{FF2B5EF4-FFF2-40B4-BE49-F238E27FC236}">
+                <a16:creationId xmlns:a16="http://schemas.microsoft.com/office/drawing/2014/main" id="{31B79F32-6A96-7047-BE64-0D9F4F4B939C}"/>
+              </a:ext>
+            </a:extLst>
+          </p:cNvPr>
+          <p:cNvSpPr>
+            <a:spLocks noGrp="1"/>
+          </p:cNvSpPr>
+          <p:nvPr>
+            <p:ph idx="1"/>
+          </p:nvPr>
+        </p:nvSpPr>
+        <p:spPr>
+          <a:xfrm>
+            <a:off x="960783" y="1341856"/>
+            <a:ext cx="10621618" cy="5037935"/>
+          </a:xfrm>
+        </p:spPr>
+        <p:txBody>
+          <a:bodyPr>
+            <a:normAutofit fontScale="85000" lnSpcReduction="20000"/>
+          </a:bodyPr>
+          <a:lstStyle/>
+          <a:p>
+            <a:r>
+              <a:rPr lang="en-US" dirty="0"/>
+              <a:t>Allows discovery mechanism to be specified</a:t>
+            </a:r>
+          </a:p>
+          <a:p>
+            <a:r>
+              <a:rPr lang="en-US" dirty="0"/>
+              <a:t>Returns discovered TDs</a:t>
+            </a:r>
+          </a:p>
+          <a:p>
+            <a:r>
+              <a:rPr lang="en-US" dirty="0"/>
+              <a:t>Assumes authentication/authorization is handled out-of-band</a:t>
+            </a:r>
+          </a:p>
+          <a:p>
+            <a:pPr marL="0" indent="0">
+              <a:buNone/>
+            </a:pPr>
+            <a:r>
+              <a:rPr lang="en-US" dirty="0"/>
+              <a:t>Discussion Points:</a:t>
+            </a:r>
+          </a:p>
+          <a:p>
+            <a:r>
+              <a:rPr lang="en-US" dirty="0"/>
+              <a:t>Not incompatible with two-phase approach</a:t>
+            </a:r>
+          </a:p>
+          <a:p>
+            <a:pPr lvl="1"/>
+            <a:r>
+              <a:rPr lang="en-US" dirty="0"/>
+              <a:t>Authentication/authorization needs to be set up outside script</a:t>
+            </a:r>
+          </a:p>
+          <a:p>
+            <a:r>
+              <a:rPr lang="en-US" dirty="0"/>
+              <a:t>Query format needs to be better standardized</a:t>
+            </a:r>
+          </a:p>
+          <a:p>
+            <a:pPr lvl="1"/>
+            <a:r>
+              <a:rPr lang="en-US" dirty="0"/>
+              <a:t>What query forms are supported?  What are the parameters?</a:t>
+            </a:r>
+          </a:p>
+          <a:p>
+            <a:pPr lvl="1"/>
+            <a:r>
+              <a:rPr lang="en-US" dirty="0"/>
+              <a:t>How can I search for Things in a particular physical location (that I am not necessarily at?)</a:t>
+            </a:r>
+          </a:p>
+          <a:p>
+            <a:r>
+              <a:rPr lang="en-US" dirty="0"/>
+              <a:t>Options to select mechanisms may be a privacy risk</a:t>
+            </a:r>
+          </a:p>
+          <a:p>
+            <a:pPr lvl="1"/>
+            <a:r>
+              <a:rPr lang="en-US" dirty="0"/>
+              <a:t>If I can discover a thing via Bluetooth, I know it is within a few meters</a:t>
+            </a:r>
+          </a:p>
+          <a:p>
+            <a:pPr lvl="1"/>
+            <a:r>
+              <a:rPr lang="en-US" dirty="0"/>
+              <a:t>Perhaps the mechanisms and desired location should also be specified out of band</a:t>
+            </a:r>
+          </a:p>
+          <a:p>
+            <a:r>
+              <a:rPr lang="en-US" dirty="0"/>
+              <a:t>Alternatives:</a:t>
+            </a:r>
+          </a:p>
+          <a:p>
+            <a:pPr lvl="1"/>
+            <a:r>
+              <a:rPr lang="en-US" dirty="0"/>
+              <a:t> “Discovery sub-API” could be factored out and run during setup, like security config</a:t>
+            </a:r>
+          </a:p>
+          <a:p>
+            <a:pPr lvl="1"/>
+            <a:r>
+              <a:rPr lang="en-US" dirty="0"/>
+              <a:t> Things to be consumed by a script perhaps managed declaratively using dependences</a:t>
+            </a:r>
+          </a:p>
+          <a:p>
+            <a:endParaRPr lang="en-US" dirty="0"/>
+          </a:p>
+          <a:p>
+            <a:endParaRPr lang="en-US" dirty="0"/>
+          </a:p>
+        </p:txBody>
+      </p:sp>
+      <p:sp>
+        <p:nvSpPr>
+          <p:cNvPr id="4" name="Slide Number Placeholder 3">
+            <a:extLst>
+              <a:ext uri="{FF2B5EF4-FFF2-40B4-BE49-F238E27FC236}">
+                <a16:creationId xmlns:a16="http://schemas.microsoft.com/office/drawing/2014/main" id="{56D5C4C6-084D-104C-AEC5-B2C14B2F60CE}"/>
+              </a:ext>
+            </a:extLst>
+          </p:cNvPr>
+          <p:cNvSpPr>
+            <a:spLocks noGrp="1"/>
+          </p:cNvSpPr>
+          <p:nvPr>
+            <p:ph type="sldNum" sz="quarter" idx="12"/>
+          </p:nvPr>
+        </p:nvSpPr>
+        <p:spPr/>
+        <p:txBody>
+          <a:bodyPr/>
+          <a:lstStyle/>
+          <a:p>
+            <a:fld id="{30564719-00ED-40AD-AF49-5F6D6B9333CD}" type="slidenum">
+              <a:rPr lang="en-US" smtClean="0"/>
+              <a:t>8</a:t>
+            </a:fld>
+            <a:endParaRPr lang="en-US"/>
+          </a:p>
+        </p:txBody>
+      </p:sp>
     </p:spTree>
     <p:extLst>
       <p:ext uri="{BB962C8B-B14F-4D97-AF65-F5344CB8AC3E}">
         <p14:creationId xmlns:p14="http://schemas.microsoft.com/office/powerpoint/2010/main" val="889419319"/>
+      </p:ext>
+    </p:extLst>
+  </p:cSld>
+  <p:clrMapOvr>
+    <a:masterClrMapping/>
+  </p:clrMapOvr>
+</p:sld>
+</file>
+
+<file path=ppt/slides/slide9.xml><?xml version="1.0" encoding="utf-8"?>
+<p:sld xmlns:a="http://schemas.openxmlformats.org/drawingml/2006/main" xmlns:r="http://schemas.openxmlformats.org/officeDocument/2006/relationships" xmlns:p="http://schemas.openxmlformats.org/presentationml/2006/main">
+  <p:cSld>
+    <p:spTree>
+      <p:nvGrpSpPr>
+        <p:cNvPr id="1" name=""/>
+        <p:cNvGrpSpPr/>
+        <p:nvPr/>
+      </p:nvGrpSpPr>
+      <p:grpSpPr>
+        <a:xfrm>
+          <a:off x="0" y="0"/>
+          <a:ext cx="0" cy="0"/>
+          <a:chOff x="0" y="0"/>
+          <a:chExt cx="0" cy="0"/>
+        </a:xfrm>
+      </p:grpSpPr>
+      <p:sp>
+        <p:nvSpPr>
+          <p:cNvPr id="2" name="Title 1">
+            <a:extLst>
+              <a:ext uri="{FF2B5EF4-FFF2-40B4-BE49-F238E27FC236}">
+                <a16:creationId xmlns:a16="http://schemas.microsoft.com/office/drawing/2014/main" id="{04A2427C-F973-7449-BD4B-BF8F9CDEB3C0}"/>
+              </a:ext>
+            </a:extLst>
+          </p:cNvPr>
+          <p:cNvSpPr>
+            <a:spLocks noGrp="1"/>
+          </p:cNvSpPr>
+          <p:nvPr>
+            <p:ph type="title"/>
+          </p:nvPr>
+        </p:nvSpPr>
+        <p:spPr/>
+        <p:txBody>
+          <a:bodyPr/>
+          <a:lstStyle/>
+          <a:p>
+            <a:r>
+              <a:rPr lang="en-US" dirty="0"/>
+              <a:t>Discussion Points</a:t>
+            </a:r>
+          </a:p>
+        </p:txBody>
+      </p:sp>
+      <p:sp>
+        <p:nvSpPr>
+          <p:cNvPr id="3" name="Content Placeholder 2">
+            <a:extLst>
+              <a:ext uri="{FF2B5EF4-FFF2-40B4-BE49-F238E27FC236}">
+                <a16:creationId xmlns:a16="http://schemas.microsoft.com/office/drawing/2014/main" id="{788EBE45-5C80-8A4E-B16D-E28ABECED163}"/>
+              </a:ext>
+            </a:extLst>
+          </p:cNvPr>
+          <p:cNvSpPr>
+            <a:spLocks noGrp="1"/>
+          </p:cNvSpPr>
+          <p:nvPr>
+            <p:ph idx="1"/>
+          </p:nvPr>
+        </p:nvSpPr>
+        <p:spPr/>
+        <p:txBody>
+          <a:bodyPr/>
+          <a:lstStyle/>
+          <a:p>
+            <a:r>
+              <a:rPr lang="en-US" dirty="0"/>
+              <a:t>Query Language</a:t>
+            </a:r>
+          </a:p>
+          <a:p>
+            <a:pPr lvl="1"/>
+            <a:r>
+              <a:rPr lang="en-US" dirty="0"/>
+              <a:t>JSON Path?</a:t>
+            </a:r>
+          </a:p>
+          <a:p>
+            <a:pPr lvl="1"/>
+            <a:r>
+              <a:rPr lang="en-US" dirty="0"/>
+              <a:t>X Path?</a:t>
+            </a:r>
+          </a:p>
+          <a:p>
+            <a:pPr lvl="1"/>
+            <a:r>
+              <a:rPr lang="en-US" dirty="0"/>
+              <a:t>Custom?</a:t>
+            </a:r>
+          </a:p>
+          <a:p>
+            <a:pPr lvl="1"/>
+            <a:r>
+              <a:rPr lang="en-US" dirty="0"/>
+              <a:t>SPARQL?</a:t>
+            </a:r>
+          </a:p>
+          <a:p>
+            <a:r>
+              <a:rPr lang="en-US" dirty="0"/>
+              <a:t>Security Schemes</a:t>
+            </a:r>
+          </a:p>
+          <a:p>
+            <a:r>
+              <a:rPr lang="en-US" dirty="0"/>
+              <a:t>Supported Introduction Protocols</a:t>
+            </a:r>
+          </a:p>
+          <a:p>
+            <a:pPr lvl="1"/>
+            <a:r>
+              <a:rPr lang="en-US" dirty="0"/>
+              <a:t>Anything that gives an address/URL will do</a:t>
+            </a:r>
+          </a:p>
+          <a:p>
+            <a:pPr lvl="1"/>
+            <a:r>
+              <a:rPr lang="en-US" dirty="0"/>
+              <a:t>Some need actions to support, </a:t>
+            </a:r>
+            <a:r>
+              <a:rPr lang="en-US" dirty="0" err="1"/>
+              <a:t>eg</a:t>
+            </a:r>
+            <a:r>
+              <a:rPr lang="en-US" dirty="0"/>
+              <a:t> service name registrations for DNS-SD</a:t>
+            </a:r>
+          </a:p>
+          <a:p>
+            <a:pPr lvl="1"/>
+            <a:r>
+              <a:rPr lang="en-US" dirty="0"/>
+              <a:t>Also need </a:t>
+            </a:r>
+            <a:r>
+              <a:rPr lang="en-US" dirty="0" err="1"/>
+              <a:t>CoRE</a:t>
+            </a:r>
+            <a:r>
+              <a:rPr lang="en-US" dirty="0"/>
+              <a:t>-RD and DID integration – as Introductions</a:t>
+            </a:r>
+          </a:p>
+        </p:txBody>
+      </p:sp>
+      <p:sp>
+        <p:nvSpPr>
+          <p:cNvPr id="4" name="Footer Placeholder 3">
+            <a:extLst>
+              <a:ext uri="{FF2B5EF4-FFF2-40B4-BE49-F238E27FC236}">
+                <a16:creationId xmlns:a16="http://schemas.microsoft.com/office/drawing/2014/main" id="{F5D81334-1F86-874B-A7C5-469BC6FEE954}"/>
+              </a:ext>
+            </a:extLst>
+          </p:cNvPr>
+          <p:cNvSpPr>
+            <a:spLocks noGrp="1"/>
+          </p:cNvSpPr>
+          <p:nvPr>
+            <p:ph type="ftr" sz="quarter" idx="11"/>
+          </p:nvPr>
+        </p:nvSpPr>
+        <p:spPr/>
+        <p:txBody>
+          <a:bodyPr/>
+          <a:lstStyle/>
+          <a:p>
+            <a:r>
+              <a:rPr lang="en-US"/>
+              <a:t>W3C Web of Things (WoT) WG/IG</a:t>
+            </a:r>
+          </a:p>
+        </p:txBody>
+      </p:sp>
+      <p:sp>
+        <p:nvSpPr>
+          <p:cNvPr id="5" name="Slide Number Placeholder 4">
+            <a:extLst>
+              <a:ext uri="{FF2B5EF4-FFF2-40B4-BE49-F238E27FC236}">
+                <a16:creationId xmlns:a16="http://schemas.microsoft.com/office/drawing/2014/main" id="{28705A5C-8F33-D346-8D1C-5278172D2E42}"/>
+              </a:ext>
+            </a:extLst>
+          </p:cNvPr>
+          <p:cNvSpPr>
+            <a:spLocks noGrp="1"/>
+          </p:cNvSpPr>
+          <p:nvPr>
+            <p:ph type="sldNum" sz="quarter" idx="12"/>
+          </p:nvPr>
+        </p:nvSpPr>
+        <p:spPr/>
+        <p:txBody>
+          <a:bodyPr/>
+          <a:lstStyle/>
+          <a:p>
+            <a:fld id="{055BDE2E-7167-1944-9FEE-E44668D91CB6}" type="slidenum">
+              <a:rPr lang="en-US" smtClean="0"/>
+              <a:t>9</a:t>
+            </a:fld>
+            <a:endParaRPr lang="en-US"/>
+          </a:p>
+        </p:txBody>
+      </p:sp>
+      <p:sp>
+        <p:nvSpPr>
+          <p:cNvPr id="6" name="Date Placeholder 5">
+            <a:extLst>
+              <a:ext uri="{FF2B5EF4-FFF2-40B4-BE49-F238E27FC236}">
+                <a16:creationId xmlns:a16="http://schemas.microsoft.com/office/drawing/2014/main" id="{7B5B3953-4AC8-BF4F-9117-6F6DABB3B832}"/>
+              </a:ext>
+            </a:extLst>
+          </p:cNvPr>
+          <p:cNvSpPr>
+            <a:spLocks noGrp="1"/>
+          </p:cNvSpPr>
+          <p:nvPr>
+            <p:ph type="dt" sz="half" idx="10"/>
+          </p:nvPr>
+        </p:nvSpPr>
+        <p:spPr/>
+        <p:txBody>
+          <a:bodyPr/>
+          <a:lstStyle/>
+          <a:p>
+            <a:fld id="{B929AB1E-7FD9-0A40-B7C0-508CCACB3E9A}" type="datetime1">
+              <a:rPr lang="en-CA" smtClean="0"/>
+              <a:t>2020-06-08</a:t>
+            </a:fld>
+            <a:endParaRPr lang="en-US"/>
+          </a:p>
+        </p:txBody>
+      </p:sp>
+    </p:spTree>
+    <p:extLst>
+      <p:ext uri="{BB962C8B-B14F-4D97-AF65-F5344CB8AC3E}">
+        <p14:creationId xmlns:p14="http://schemas.microsoft.com/office/powerpoint/2010/main" val="2389208339"/>
       </p:ext>
     </p:extLst>
   </p:cSld>

</xml_diff>